<commit_message>
Finished PPT. Left KNN slide for Balaji
</commit_message>
<xml_diff>
--- a/PPT/Case_Study_Analysis_DDS6306.pptx
+++ b/PPT/Case_Study_Analysis_DDS6306.pptx
@@ -13,6 +13,9 @@
     <p:sldId id="261" r:id="rId7"/>
     <p:sldId id="262" r:id="rId8"/>
     <p:sldId id="263" r:id="rId9"/>
+    <p:sldId id="264" r:id="rId10"/>
+    <p:sldId id="265" r:id="rId11"/>
+    <p:sldId id="266" r:id="rId12"/>
   </p:sldIdLst>
   <p:sldSz cx="12192000" cy="6858000"/>
   <p:notesSz cx="6858000" cy="9144000"/>
@@ -111,6 +114,11 @@
       </a:defRPr>
     </a:lvl9pPr>
   </p:defaultTextStyle>
+  <p:extLst>
+    <p:ext uri="{EFAFB233-063F-42B5-8137-9DF3F51BA10A}">
+      <p15:sldGuideLst xmlns:p15="http://schemas.microsoft.com/office/powerpoint/2012/main"/>
+    </p:ext>
+  </p:extLst>
 </p:presentation>
 </file>
 
@@ -253,7 +261,7 @@
           <a:p>
             <a:fld id="{54DE4EA5-D626-4B22-BD71-66DAAEC9E505}" type="datetimeFigureOut">
               <a:rPr lang="en-US" smtClean="0"/>
-              <a:t>2/25/2020</a:t>
+              <a:t>2/26/2020</a:t>
             </a:fld>
             <a:endParaRPr lang="en-US"/>
           </a:p>
@@ -464,7 +472,7 @@
           <a:p>
             <a:fld id="{54DE4EA5-D626-4B22-BD71-66DAAEC9E505}" type="datetimeFigureOut">
               <a:rPr lang="en-US" smtClean="0"/>
-              <a:t>2/25/2020</a:t>
+              <a:t>2/26/2020</a:t>
             </a:fld>
             <a:endParaRPr lang="en-US"/>
           </a:p>
@@ -679,7 +687,7 @@
           <a:p>
             <a:fld id="{54DE4EA5-D626-4B22-BD71-66DAAEC9E505}" type="datetimeFigureOut">
               <a:rPr lang="en-US" smtClean="0"/>
-              <a:t>2/25/2020</a:t>
+              <a:t>2/26/2020</a:t>
             </a:fld>
             <a:endParaRPr lang="en-US"/>
           </a:p>
@@ -880,7 +888,7 @@
           <a:p>
             <a:fld id="{54DE4EA5-D626-4B22-BD71-66DAAEC9E505}" type="datetimeFigureOut">
               <a:rPr lang="en-US" smtClean="0"/>
-              <a:t>2/25/2020</a:t>
+              <a:t>2/26/2020</a:t>
             </a:fld>
             <a:endParaRPr lang="en-US"/>
           </a:p>
@@ -1159,7 +1167,7 @@
           <a:p>
             <a:fld id="{54DE4EA5-D626-4B22-BD71-66DAAEC9E505}" type="datetimeFigureOut">
               <a:rPr lang="en-US" smtClean="0"/>
-              <a:t>2/25/2020</a:t>
+              <a:t>2/26/2020</a:t>
             </a:fld>
             <a:endParaRPr lang="en-US"/>
           </a:p>
@@ -1427,7 +1435,7 @@
           <a:p>
             <a:fld id="{54DE4EA5-D626-4B22-BD71-66DAAEC9E505}" type="datetimeFigureOut">
               <a:rPr lang="en-US" smtClean="0"/>
-              <a:t>2/25/2020</a:t>
+              <a:t>2/26/2020</a:t>
             </a:fld>
             <a:endParaRPr lang="en-US"/>
           </a:p>
@@ -1843,7 +1851,7 @@
           <a:p>
             <a:fld id="{54DE4EA5-D626-4B22-BD71-66DAAEC9E505}" type="datetimeFigureOut">
               <a:rPr lang="en-US" smtClean="0"/>
-              <a:t>2/25/2020</a:t>
+              <a:t>2/26/2020</a:t>
             </a:fld>
             <a:endParaRPr lang="en-US"/>
           </a:p>
@@ -1992,7 +2000,7 @@
           <a:p>
             <a:fld id="{54DE4EA5-D626-4B22-BD71-66DAAEC9E505}" type="datetimeFigureOut">
               <a:rPr lang="en-US" smtClean="0"/>
-              <a:t>2/25/2020</a:t>
+              <a:t>2/26/2020</a:t>
             </a:fld>
             <a:endParaRPr lang="en-US"/>
           </a:p>
@@ -2118,7 +2126,7 @@
           <a:p>
             <a:fld id="{54DE4EA5-D626-4B22-BD71-66DAAEC9E505}" type="datetimeFigureOut">
               <a:rPr lang="en-US" smtClean="0"/>
-              <a:t>2/25/2020</a:t>
+              <a:t>2/26/2020</a:t>
             </a:fld>
             <a:endParaRPr lang="en-US"/>
           </a:p>
@@ -2369,7 +2377,7 @@
           <a:p>
             <a:fld id="{54DE4EA5-D626-4B22-BD71-66DAAEC9E505}" type="datetimeFigureOut">
               <a:rPr lang="en-US" smtClean="0"/>
-              <a:t>2/25/2020</a:t>
+              <a:t>2/26/2020</a:t>
             </a:fld>
             <a:endParaRPr lang="en-US"/>
           </a:p>
@@ -2814,7 +2822,7 @@
           <a:p>
             <a:fld id="{54DE4EA5-D626-4B22-BD71-66DAAEC9E505}" type="datetimeFigureOut">
               <a:rPr lang="en-US" smtClean="0"/>
-              <a:t>2/25/2020</a:t>
+              <a:t>2/26/2020</a:t>
             </a:fld>
             <a:endParaRPr lang="en-US"/>
           </a:p>
@@ -3141,7 +3149,7 @@
           <a:p>
             <a:fld id="{54DE4EA5-D626-4B22-BD71-66DAAEC9E505}" type="datetimeFigureOut">
               <a:rPr lang="en-US" smtClean="0"/>
-              <a:t>2/25/2020</a:t>
+              <a:t>2/26/2020</a:t>
             </a:fld>
             <a:endParaRPr lang="en-US"/>
           </a:p>
@@ -3710,6 +3718,269 @@
 </p:sld>
 </file>
 
+<file path=ppt/slides/slide10.xml><?xml version="1.0" encoding="utf-8"?>
+<p:sld xmlns:a="http://schemas.openxmlformats.org/drawingml/2006/main" xmlns:r="http://schemas.openxmlformats.org/officeDocument/2006/relationships" xmlns:p="http://schemas.openxmlformats.org/presentationml/2006/main">
+  <p:cSld>
+    <p:spTree>
+      <p:nvGrpSpPr>
+        <p:cNvPr id="1" name=""/>
+        <p:cNvGrpSpPr/>
+        <p:nvPr/>
+      </p:nvGrpSpPr>
+      <p:grpSpPr>
+        <a:xfrm>
+          <a:off x="0" y="0"/>
+          <a:ext cx="0" cy="0"/>
+          <a:chOff x="0" y="0"/>
+          <a:chExt cx="0" cy="0"/>
+        </a:xfrm>
+      </p:grpSpPr>
+      <p:sp>
+        <p:nvSpPr>
+          <p:cNvPr id="2" name="Title 1">
+            <a:extLst>
+              <a:ext uri="{FF2B5EF4-FFF2-40B4-BE49-F238E27FC236}">
+                <a16:creationId xmlns:a16="http://schemas.microsoft.com/office/drawing/2014/main" id="{254C8F76-F231-43E4-9BF8-5CBE6F085B8B}"/>
+              </a:ext>
+            </a:extLst>
+          </p:cNvPr>
+          <p:cNvSpPr>
+            <a:spLocks noGrp="1"/>
+          </p:cNvSpPr>
+          <p:nvPr>
+            <p:ph type="title"/>
+          </p:nvPr>
+        </p:nvSpPr>
+        <p:spPr/>
+        <p:txBody>
+          <a:bodyPr/>
+          <a:lstStyle/>
+          <a:p>
+            <a:r>
+              <a:rPr lang="en-US" cap="none" dirty="0"/>
+              <a:t>Predictive </a:t>
+            </a:r>
+            <a:r>
+              <a:rPr lang="en-US" cap="none" dirty="0" err="1"/>
+              <a:t>kNN</a:t>
+            </a:r>
+            <a:r>
+              <a:rPr lang="en-US" cap="none" dirty="0"/>
+              <a:t> Modeling (Ale vs IPA) – Balaji Slide</a:t>
+            </a:r>
+          </a:p>
+        </p:txBody>
+      </p:sp>
+      <p:sp>
+        <p:nvSpPr>
+          <p:cNvPr id="4" name="Content Placeholder 3">
+            <a:extLst>
+              <a:ext uri="{FF2B5EF4-FFF2-40B4-BE49-F238E27FC236}">
+                <a16:creationId xmlns:a16="http://schemas.microsoft.com/office/drawing/2014/main" id="{07DD1190-9F5E-44CA-B6B3-5D40D4E2EF74}"/>
+              </a:ext>
+            </a:extLst>
+          </p:cNvPr>
+          <p:cNvSpPr>
+            <a:spLocks noGrp="1"/>
+          </p:cNvSpPr>
+          <p:nvPr>
+            <p:ph sz="half" idx="1"/>
+          </p:nvPr>
+        </p:nvSpPr>
+        <p:spPr/>
+        <p:txBody>
+          <a:bodyPr/>
+          <a:lstStyle/>
+          <a:p>
+            <a:endParaRPr lang="en-US"/>
+          </a:p>
+        </p:txBody>
+      </p:sp>
+      <p:sp>
+        <p:nvSpPr>
+          <p:cNvPr id="5" name="Content Placeholder 4">
+            <a:extLst>
+              <a:ext uri="{FF2B5EF4-FFF2-40B4-BE49-F238E27FC236}">
+                <a16:creationId xmlns:a16="http://schemas.microsoft.com/office/drawing/2014/main" id="{BB4F4CCF-DE42-466A-9197-1F1B324066A8}"/>
+              </a:ext>
+            </a:extLst>
+          </p:cNvPr>
+          <p:cNvSpPr>
+            <a:spLocks noGrp="1"/>
+          </p:cNvSpPr>
+          <p:nvPr>
+            <p:ph sz="half" idx="2"/>
+          </p:nvPr>
+        </p:nvSpPr>
+        <p:spPr/>
+        <p:txBody>
+          <a:bodyPr/>
+          <a:lstStyle/>
+          <a:p>
+            <a:endParaRPr lang="en-US"/>
+          </a:p>
+        </p:txBody>
+      </p:sp>
+    </p:spTree>
+    <p:extLst>
+      <p:ext uri="{BB962C8B-B14F-4D97-AF65-F5344CB8AC3E}">
+        <p14:creationId xmlns:p14="http://schemas.microsoft.com/office/powerpoint/2010/main" val="791921707"/>
+      </p:ext>
+    </p:extLst>
+  </p:cSld>
+  <p:clrMapOvr>
+    <a:masterClrMapping/>
+  </p:clrMapOvr>
+</p:sld>
+</file>
+
+<file path=ppt/slides/slide11.xml><?xml version="1.0" encoding="utf-8"?>
+<p:sld xmlns:a="http://schemas.openxmlformats.org/drawingml/2006/main" xmlns:r="http://schemas.openxmlformats.org/officeDocument/2006/relationships" xmlns:p="http://schemas.openxmlformats.org/presentationml/2006/main">
+  <p:cSld>
+    <p:spTree>
+      <p:nvGrpSpPr>
+        <p:cNvPr id="1" name=""/>
+        <p:cNvGrpSpPr/>
+        <p:nvPr/>
+      </p:nvGrpSpPr>
+      <p:grpSpPr>
+        <a:xfrm>
+          <a:off x="0" y="0"/>
+          <a:ext cx="0" cy="0"/>
+          <a:chOff x="0" y="0"/>
+          <a:chExt cx="0" cy="0"/>
+        </a:xfrm>
+      </p:grpSpPr>
+      <p:sp>
+        <p:nvSpPr>
+          <p:cNvPr id="2" name="Title 1">
+            <a:extLst>
+              <a:ext uri="{FF2B5EF4-FFF2-40B4-BE49-F238E27FC236}">
+                <a16:creationId xmlns:a16="http://schemas.microsoft.com/office/drawing/2014/main" id="{4FECE46D-DD3F-47DF-BB37-355AD059BF5E}"/>
+              </a:ext>
+            </a:extLst>
+          </p:cNvPr>
+          <p:cNvSpPr>
+            <a:spLocks noGrp="1"/>
+          </p:cNvSpPr>
+          <p:nvPr>
+            <p:ph type="title"/>
+          </p:nvPr>
+        </p:nvSpPr>
+        <p:spPr/>
+        <p:txBody>
+          <a:bodyPr/>
+          <a:lstStyle/>
+          <a:p>
+            <a:r>
+              <a:rPr lang="en-US" cap="none" dirty="0"/>
+              <a:t>IPA Recommendations based on ABV</a:t>
+            </a:r>
+          </a:p>
+        </p:txBody>
+      </p:sp>
+      <p:sp>
+        <p:nvSpPr>
+          <p:cNvPr id="3" name="Content Placeholder 2">
+            <a:extLst>
+              <a:ext uri="{FF2B5EF4-FFF2-40B4-BE49-F238E27FC236}">
+                <a16:creationId xmlns:a16="http://schemas.microsoft.com/office/drawing/2014/main" id="{05758653-C1B0-415E-A951-356C7EF6CCEC}"/>
+              </a:ext>
+            </a:extLst>
+          </p:cNvPr>
+          <p:cNvSpPr>
+            <a:spLocks noGrp="1"/>
+          </p:cNvSpPr>
+          <p:nvPr>
+            <p:ph sz="half" idx="1"/>
+          </p:nvPr>
+        </p:nvSpPr>
+        <p:spPr>
+          <a:xfrm>
+            <a:off x="331596" y="2017343"/>
+            <a:ext cx="4645152" cy="3448595"/>
+          </a:xfrm>
+        </p:spPr>
+        <p:txBody>
+          <a:bodyPr>
+            <a:normAutofit fontScale="92500" lnSpcReduction="10000"/>
+          </a:bodyPr>
+          <a:lstStyle/>
+          <a:p>
+            <a:r>
+              <a:rPr lang="en-US" dirty="0"/>
+              <a:t>We ran a test to see if the mean ABV was different in IPA vs Other Ale’s</a:t>
+            </a:r>
+          </a:p>
+          <a:p>
+            <a:r>
+              <a:rPr lang="en-US" dirty="0"/>
+              <a:t>We found strong evidence that IPA’s have about 1.1%-1.4% more ABV</a:t>
+            </a:r>
+          </a:p>
+          <a:p>
+            <a:r>
+              <a:rPr lang="en-US" dirty="0"/>
+              <a:t>Heat Map to the right shows states that prefer higher ABV content</a:t>
+            </a:r>
+          </a:p>
+          <a:p>
+            <a:r>
+              <a:rPr lang="en-US" dirty="0"/>
+              <a:t>Suggestion: Target higher ABV areas to produce more IPA’s to increase sales</a:t>
+            </a:r>
+          </a:p>
+          <a:p>
+            <a:r>
+              <a:rPr lang="en-US" dirty="0"/>
+              <a:t>Top 3: Texas, South Carolina, Virginia</a:t>
+            </a:r>
+          </a:p>
+        </p:txBody>
+      </p:sp>
+      <p:pic>
+        <p:nvPicPr>
+          <p:cNvPr id="10" name="Picture 9">
+            <a:extLst>
+              <a:ext uri="{FF2B5EF4-FFF2-40B4-BE49-F238E27FC236}">
+                <a16:creationId xmlns:a16="http://schemas.microsoft.com/office/drawing/2014/main" id="{9B8D7261-3C51-42ED-82F9-48A2F6C3C2C0}"/>
+              </a:ext>
+            </a:extLst>
+          </p:cNvPr>
+          <p:cNvPicPr>
+            <a:picLocks noChangeAspect="1"/>
+          </p:cNvPicPr>
+          <p:nvPr/>
+        </p:nvPicPr>
+        <p:blipFill>
+          <a:blip r:embed="rId2"/>
+          <a:stretch>
+            <a:fillRect/>
+          </a:stretch>
+        </p:blipFill>
+        <p:spPr>
+          <a:xfrm>
+            <a:off x="4976748" y="2163836"/>
+            <a:ext cx="7009202" cy="3155607"/>
+          </a:xfrm>
+          <a:prstGeom prst="rect">
+            <a:avLst/>
+          </a:prstGeom>
+        </p:spPr>
+      </p:pic>
+    </p:spTree>
+    <p:extLst>
+      <p:ext uri="{BB962C8B-B14F-4D97-AF65-F5344CB8AC3E}">
+        <p14:creationId xmlns:p14="http://schemas.microsoft.com/office/powerpoint/2010/main" val="3277231889"/>
+      </p:ext>
+    </p:extLst>
+  </p:cSld>
+  <p:clrMapOvr>
+    <a:masterClrMapping/>
+  </p:clrMapOvr>
+</p:sld>
+</file>
+
 <file path=ppt/slides/slide2.xml><?xml version="1.0" encoding="utf-8"?>
 <p:sld xmlns:a="http://schemas.openxmlformats.org/drawingml/2006/main" xmlns:r="http://schemas.openxmlformats.org/officeDocument/2006/relationships" xmlns:p="http://schemas.openxmlformats.org/presentationml/2006/main">
   <p:cSld>
@@ -9407,6 +9678,145 @@
     <p:extLst>
       <p:ext uri="{BB962C8B-B14F-4D97-AF65-F5344CB8AC3E}">
         <p14:creationId xmlns:p14="http://schemas.microsoft.com/office/powerpoint/2010/main" val="1329204041"/>
+      </p:ext>
+    </p:extLst>
+  </p:cSld>
+  <p:clrMapOvr>
+    <a:masterClrMapping/>
+  </p:clrMapOvr>
+</p:sld>
+</file>
+
+<file path=ppt/slides/slide9.xml><?xml version="1.0" encoding="utf-8"?>
+<p:sld xmlns:a="http://schemas.openxmlformats.org/drawingml/2006/main" xmlns:r="http://schemas.openxmlformats.org/officeDocument/2006/relationships" xmlns:p="http://schemas.openxmlformats.org/presentationml/2006/main">
+  <p:cSld>
+    <p:spTree>
+      <p:nvGrpSpPr>
+        <p:cNvPr id="1" name=""/>
+        <p:cNvGrpSpPr/>
+        <p:nvPr/>
+      </p:nvGrpSpPr>
+      <p:grpSpPr>
+        <a:xfrm>
+          <a:off x="0" y="0"/>
+          <a:ext cx="0" cy="0"/>
+          <a:chOff x="0" y="0"/>
+          <a:chExt cx="0" cy="0"/>
+        </a:xfrm>
+      </p:grpSpPr>
+      <p:sp>
+        <p:nvSpPr>
+          <p:cNvPr id="2" name="Title 1">
+            <a:extLst>
+              <a:ext uri="{FF2B5EF4-FFF2-40B4-BE49-F238E27FC236}">
+                <a16:creationId xmlns:a16="http://schemas.microsoft.com/office/drawing/2014/main" id="{7E063D2A-F8E6-4530-8F33-96641FD3927A}"/>
+              </a:ext>
+            </a:extLst>
+          </p:cNvPr>
+          <p:cNvSpPr>
+            <a:spLocks noGrp="1"/>
+          </p:cNvSpPr>
+          <p:nvPr>
+            <p:ph type="title"/>
+          </p:nvPr>
+        </p:nvSpPr>
+        <p:spPr/>
+        <p:txBody>
+          <a:bodyPr/>
+          <a:lstStyle/>
+          <a:p>
+            <a:r>
+              <a:rPr lang="en-US" cap="none" dirty="0"/>
+              <a:t>IBU vs ABV Relationship</a:t>
+            </a:r>
+          </a:p>
+        </p:txBody>
+      </p:sp>
+      <p:pic>
+        <p:nvPicPr>
+          <p:cNvPr id="4" name="Content Placeholder 3">
+            <a:extLst>
+              <a:ext uri="{FF2B5EF4-FFF2-40B4-BE49-F238E27FC236}">
+                <a16:creationId xmlns:a16="http://schemas.microsoft.com/office/drawing/2014/main" id="{D5F02277-F875-4BA4-85BD-C9917BBA072A}"/>
+              </a:ext>
+            </a:extLst>
+          </p:cNvPr>
+          <p:cNvPicPr>
+            <a:picLocks noGrp="1" noChangeAspect="1"/>
+          </p:cNvPicPr>
+          <p:nvPr>
+            <p:ph idx="1"/>
+          </p:nvPr>
+        </p:nvPicPr>
+        <p:blipFill>
+          <a:blip r:embed="rId2"/>
+          <a:stretch>
+            <a:fillRect/>
+          </a:stretch>
+        </p:blipFill>
+        <p:spPr>
+          <a:xfrm>
+            <a:off x="4514648" y="2251873"/>
+            <a:ext cx="6540206" cy="3449638"/>
+          </a:xfrm>
+          <a:prstGeom prst="rect">
+            <a:avLst/>
+          </a:prstGeom>
+        </p:spPr>
+      </p:pic>
+      <p:sp>
+        <p:nvSpPr>
+          <p:cNvPr id="5" name="TextBox 4">
+            <a:extLst>
+              <a:ext uri="{FF2B5EF4-FFF2-40B4-BE49-F238E27FC236}">
+                <a16:creationId xmlns:a16="http://schemas.microsoft.com/office/drawing/2014/main" id="{EAED369C-7381-4853-90B9-AA29C7847B78}"/>
+              </a:ext>
+            </a:extLst>
+          </p:cNvPr>
+          <p:cNvSpPr txBox="1"/>
+          <p:nvPr/>
+        </p:nvSpPr>
+        <p:spPr>
+          <a:xfrm>
+            <a:off x="268449" y="2828835"/>
+            <a:ext cx="4025516" cy="1200329"/>
+          </a:xfrm>
+          <a:prstGeom prst="rect">
+            <a:avLst/>
+          </a:prstGeom>
+          <a:noFill/>
+        </p:spPr>
+        <p:txBody>
+          <a:bodyPr wrap="square" rtlCol="0">
+            <a:spAutoFit/>
+          </a:bodyPr>
+          <a:lstStyle/>
+          <a:p>
+            <a:pPr marL="285750" indent="-285750">
+              <a:buFont typeface="Arial" panose="020B0604020202020204" pitchFamily="34" charset="0"/>
+              <a:buChar char="•"/>
+            </a:pPr>
+            <a:r>
+              <a:rPr lang="en-US" dirty="0"/>
+              <a:t>Positive linear correlation between IBU and ABV</a:t>
+            </a:r>
+          </a:p>
+          <a:p>
+            <a:pPr marL="285750" indent="-285750">
+              <a:buFont typeface="Arial" panose="020B0604020202020204" pitchFamily="34" charset="0"/>
+              <a:buChar char="•"/>
+            </a:pPr>
+            <a:r>
+              <a:rPr lang="en-US" dirty="0"/>
+              <a:t>As bitterness increases, the ABV tends to increase slightly</a:t>
+            </a:r>
+          </a:p>
+        </p:txBody>
+      </p:sp>
+    </p:spTree>
+    <p:extLst>
+      <p:ext uri="{BB962C8B-B14F-4D97-AF65-F5344CB8AC3E}">
+        <p14:creationId xmlns:p14="http://schemas.microsoft.com/office/powerpoint/2010/main" val="1865811079"/>
       </p:ext>
     </p:extLst>
   </p:cSld>

</xml_diff>

<commit_message>
Final touches for PPT
</commit_message>
<xml_diff>
--- a/PPT/Case_Study_Analysis_DDS6306.pptx
+++ b/PPT/Case_Study_Analysis_DDS6306.pptx
@@ -261,7 +261,7 @@
           <a:p>
             <a:fld id="{54DE4EA5-D626-4B22-BD71-66DAAEC9E505}" type="datetimeFigureOut">
               <a:rPr lang="en-US" smtClean="0"/>
-              <a:t>2/26/2020</a:t>
+              <a:t>2/27/2020</a:t>
             </a:fld>
             <a:endParaRPr lang="en-US"/>
           </a:p>
@@ -472,7 +472,7 @@
           <a:p>
             <a:fld id="{54DE4EA5-D626-4B22-BD71-66DAAEC9E505}" type="datetimeFigureOut">
               <a:rPr lang="en-US" smtClean="0"/>
-              <a:t>2/26/2020</a:t>
+              <a:t>2/27/2020</a:t>
             </a:fld>
             <a:endParaRPr lang="en-US"/>
           </a:p>
@@ -687,7 +687,7 @@
           <a:p>
             <a:fld id="{54DE4EA5-D626-4B22-BD71-66DAAEC9E505}" type="datetimeFigureOut">
               <a:rPr lang="en-US" smtClean="0"/>
-              <a:t>2/26/2020</a:t>
+              <a:t>2/27/2020</a:t>
             </a:fld>
             <a:endParaRPr lang="en-US"/>
           </a:p>
@@ -888,7 +888,7 @@
           <a:p>
             <a:fld id="{54DE4EA5-D626-4B22-BD71-66DAAEC9E505}" type="datetimeFigureOut">
               <a:rPr lang="en-US" smtClean="0"/>
-              <a:t>2/26/2020</a:t>
+              <a:t>2/27/2020</a:t>
             </a:fld>
             <a:endParaRPr lang="en-US"/>
           </a:p>
@@ -1167,7 +1167,7 @@
           <a:p>
             <a:fld id="{54DE4EA5-D626-4B22-BD71-66DAAEC9E505}" type="datetimeFigureOut">
               <a:rPr lang="en-US" smtClean="0"/>
-              <a:t>2/26/2020</a:t>
+              <a:t>2/27/2020</a:t>
             </a:fld>
             <a:endParaRPr lang="en-US"/>
           </a:p>
@@ -1435,7 +1435,7 @@
           <a:p>
             <a:fld id="{54DE4EA5-D626-4B22-BD71-66DAAEC9E505}" type="datetimeFigureOut">
               <a:rPr lang="en-US" smtClean="0"/>
-              <a:t>2/26/2020</a:t>
+              <a:t>2/27/2020</a:t>
             </a:fld>
             <a:endParaRPr lang="en-US"/>
           </a:p>
@@ -1851,7 +1851,7 @@
           <a:p>
             <a:fld id="{54DE4EA5-D626-4B22-BD71-66DAAEC9E505}" type="datetimeFigureOut">
               <a:rPr lang="en-US" smtClean="0"/>
-              <a:t>2/26/2020</a:t>
+              <a:t>2/27/2020</a:t>
             </a:fld>
             <a:endParaRPr lang="en-US"/>
           </a:p>
@@ -2000,7 +2000,7 @@
           <a:p>
             <a:fld id="{54DE4EA5-D626-4B22-BD71-66DAAEC9E505}" type="datetimeFigureOut">
               <a:rPr lang="en-US" smtClean="0"/>
-              <a:t>2/26/2020</a:t>
+              <a:t>2/27/2020</a:t>
             </a:fld>
             <a:endParaRPr lang="en-US"/>
           </a:p>
@@ -2126,7 +2126,7 @@
           <a:p>
             <a:fld id="{54DE4EA5-D626-4B22-BD71-66DAAEC9E505}" type="datetimeFigureOut">
               <a:rPr lang="en-US" smtClean="0"/>
-              <a:t>2/26/2020</a:t>
+              <a:t>2/27/2020</a:t>
             </a:fld>
             <a:endParaRPr lang="en-US"/>
           </a:p>
@@ -2377,7 +2377,7 @@
           <a:p>
             <a:fld id="{54DE4EA5-D626-4B22-BD71-66DAAEC9E505}" type="datetimeFigureOut">
               <a:rPr lang="en-US" smtClean="0"/>
-              <a:t>2/26/2020</a:t>
+              <a:t>2/27/2020</a:t>
             </a:fld>
             <a:endParaRPr lang="en-US"/>
           </a:p>
@@ -2822,7 +2822,7 @@
           <a:p>
             <a:fld id="{54DE4EA5-D626-4B22-BD71-66DAAEC9E505}" type="datetimeFigureOut">
               <a:rPr lang="en-US" smtClean="0"/>
-              <a:t>2/26/2020</a:t>
+              <a:t>2/27/2020</a:t>
             </a:fld>
             <a:endParaRPr lang="en-US"/>
           </a:p>
@@ -3149,7 +3149,7 @@
           <a:p>
             <a:fld id="{54DE4EA5-D626-4B22-BD71-66DAAEC9E505}" type="datetimeFigureOut">
               <a:rPr lang="en-US" smtClean="0"/>
-              <a:t>2/26/2020</a:t>
+              <a:t>2/27/2020</a:t>
             </a:fld>
             <a:endParaRPr lang="en-US"/>
           </a:p>
@@ -3721,6 +3721,30 @@
 <file path=ppt/slides/slide10.xml><?xml version="1.0" encoding="utf-8"?>
 <p:sld xmlns:a="http://schemas.openxmlformats.org/drawingml/2006/main" xmlns:r="http://schemas.openxmlformats.org/officeDocument/2006/relationships" xmlns:p="http://schemas.openxmlformats.org/presentationml/2006/main">
   <p:cSld>
+    <p:bg>
+      <p:bgPr>
+        <a:gradFill rotWithShape="1">
+          <a:gsLst>
+            <a:gs pos="0">
+              <a:schemeClr val="bg2">
+                <a:tint val="94000"/>
+                <a:satMod val="80000"/>
+                <a:lumMod val="106000"/>
+              </a:schemeClr>
+            </a:gs>
+            <a:gs pos="100000">
+              <a:schemeClr val="bg2">
+                <a:shade val="80000"/>
+              </a:schemeClr>
+            </a:gs>
+          </a:gsLst>
+          <a:path path="circle">
+            <a:fillToRect l="43000" r="43000" b="100000"/>
+          </a:path>
+        </a:gradFill>
+        <a:effectLst/>
+      </p:bgPr>
+    </p:bg>
     <p:spTree>
       <p:nvGrpSpPr>
         <p:cNvPr id="1" name=""/>
@@ -3737,6 +3761,218 @@
       </p:grpSpPr>
       <p:sp>
         <p:nvSpPr>
+          <p:cNvPr id="11" name="Rectangle 10">
+            <a:extLst>
+              <a:ext uri="{FF2B5EF4-FFF2-40B4-BE49-F238E27FC236}">
+                <a16:creationId xmlns:a16="http://schemas.microsoft.com/office/drawing/2014/main" id="{0CABCAE3-64FC-4149-819F-2C1812824154}"/>
+              </a:ext>
+              <a:ext uri="{C183D7F6-B498-43B3-948B-1728B52AA6E4}">
+                <adec:decorative xmlns:adec="http://schemas.microsoft.com/office/drawing/2017/decorative" val="1"/>
+              </a:ext>
+            </a:extLst>
+          </p:cNvPr>
+          <p:cNvSpPr>
+            <a:spLocks noGrp="1" noRot="1" noChangeAspect="1" noMove="1" noResize="1" noEditPoints="1" noAdjustHandles="1" noChangeArrowheads="1" noChangeShapeType="1" noTextEdit="1"/>
+          </p:cNvSpPr>
+          <p:nvPr>
+            <p:extLst>
+              <p:ext uri="{386F3935-93C4-4BCD-93E2-E3B085C9AB24}">
+                <p16:designElem xmlns:p16="http://schemas.microsoft.com/office/powerpoint/2015/main" val="1"/>
+              </p:ext>
+            </p:extLst>
+          </p:nvPr>
+        </p:nvSpPr>
+        <p:spPr>
+          <a:xfrm>
+            <a:off x="0" y="2019476"/>
+            <a:ext cx="12192000" cy="4105941"/>
+          </a:xfrm>
+          <a:prstGeom prst="rect">
+            <a:avLst/>
+          </a:prstGeom>
+          <a:gradFill flip="none" rotWithShape="1">
+            <a:gsLst>
+              <a:gs pos="0">
+                <a:schemeClr val="bg2">
+                  <a:alpha val="0"/>
+                </a:schemeClr>
+              </a:gs>
+              <a:gs pos="100000">
+                <a:schemeClr val="bg2"/>
+              </a:gs>
+            </a:gsLst>
+            <a:lin ang="5400000" scaled="0"/>
+            <a:tileRect/>
+          </a:gradFill>
+          <a:ln>
+            <a:noFill/>
+          </a:ln>
+        </p:spPr>
+        <p:style>
+          <a:lnRef idx="2">
+            <a:schemeClr val="accent1">
+              <a:shade val="50000"/>
+            </a:schemeClr>
+          </a:lnRef>
+          <a:fillRef idx="1">
+            <a:schemeClr val="accent1"/>
+          </a:fillRef>
+          <a:effectRef idx="0">
+            <a:schemeClr val="accent1"/>
+          </a:effectRef>
+          <a:fontRef idx="minor">
+            <a:schemeClr val="lt1"/>
+          </a:fontRef>
+        </p:style>
+      </p:sp>
+      <p:pic>
+        <p:nvPicPr>
+          <p:cNvPr id="13" name="Picture 12">
+            <a:extLst>
+              <a:ext uri="{FF2B5EF4-FFF2-40B4-BE49-F238E27FC236}">
+                <a16:creationId xmlns:a16="http://schemas.microsoft.com/office/drawing/2014/main" id="{012FDCFE-9AD2-4D8A-8CBF-B3AA37EBF6DD}"/>
+              </a:ext>
+              <a:ext uri="{C183D7F6-B498-43B3-948B-1728B52AA6E4}">
+                <adec:decorative xmlns:adec="http://schemas.microsoft.com/office/drawing/2017/decorative" val="1"/>
+              </a:ext>
+            </a:extLst>
+          </p:cNvPr>
+          <p:cNvPicPr>
+            <a:picLocks noGrp="1" noRot="1" noChangeAspect="1" noMove="1" noResize="1" noEditPoints="1" noAdjustHandles="1" noChangeArrowheads="1" noChangeShapeType="1" noCrop="1"/>
+          </p:cNvPicPr>
+          <p:nvPr>
+            <p:extLst>
+              <p:ext uri="{386F3935-93C4-4BCD-93E2-E3B085C9AB24}">
+                <p16:designElem xmlns:p16="http://schemas.microsoft.com/office/powerpoint/2015/main" val="1"/>
+              </p:ext>
+            </p:extLst>
+          </p:nvPr>
+        </p:nvPicPr>
+        <p:blipFill rotWithShape="1">
+          <a:blip r:embed="rId2">
+            <a:extLst>
+              <a:ext uri="{28A0092B-C50C-407E-A947-70E740481C1C}">
+                <a14:useLocalDpi xmlns:a14="http://schemas.microsoft.com/office/drawing/2010/main" val="0"/>
+              </a:ext>
+            </a:extLst>
+          </a:blip>
+          <a:srcRect t="1538" b="-1538"/>
+          <a:stretch/>
+        </p:blipFill>
+        <p:spPr bwMode="black">
+          <a:xfrm>
+            <a:off x="0" y="6126480"/>
+            <a:ext cx="12192000" cy="742950"/>
+          </a:xfrm>
+          <a:prstGeom prst="rect">
+            <a:avLst/>
+          </a:prstGeom>
+        </p:spPr>
+      </p:pic>
+      <p:cxnSp>
+        <p:nvCxnSpPr>
+          <p:cNvPr id="15" name="Straight Connector 14">
+            <a:extLst>
+              <a:ext uri="{FF2B5EF4-FFF2-40B4-BE49-F238E27FC236}">
+                <a16:creationId xmlns:a16="http://schemas.microsoft.com/office/drawing/2014/main" id="{FBD463FC-4CA8-4FF4-85A3-AF9F4B98D210}"/>
+              </a:ext>
+              <a:ext uri="{C183D7F6-B498-43B3-948B-1728B52AA6E4}">
+                <adec:decorative xmlns:adec="http://schemas.microsoft.com/office/drawing/2017/decorative" val="1"/>
+              </a:ext>
+            </a:extLst>
+          </p:cNvPr>
+          <p:cNvCxnSpPr>
+            <a:cxnSpLocks noGrp="1" noRot="1" noChangeAspect="1" noMove="1" noResize="1" noEditPoints="1" noAdjustHandles="1" noChangeArrowheads="1" noChangeShapeType="1"/>
+          </p:cNvCxnSpPr>
+          <p:nvPr>
+            <p:extLst>
+              <p:ext uri="{386F3935-93C4-4BCD-93E2-E3B085C9AB24}">
+                <p16:designElem xmlns:p16="http://schemas.microsoft.com/office/powerpoint/2015/main" val="1"/>
+              </p:ext>
+            </p:extLst>
+          </p:nvPr>
+        </p:nvCxnSpPr>
+        <p:spPr>
+          <a:xfrm>
+            <a:off x="0" y="6128413"/>
+            <a:ext cx="12192000" cy="0"/>
+          </a:xfrm>
+          <a:prstGeom prst="line">
+            <a:avLst/>
+          </a:prstGeom>
+          <a:ln w="12700">
+            <a:solidFill>
+              <a:srgbClr val="000001">
+                <a:alpha val="20000"/>
+              </a:srgbClr>
+            </a:solidFill>
+          </a:ln>
+        </p:spPr>
+        <p:style>
+          <a:lnRef idx="1">
+            <a:schemeClr val="accent1"/>
+          </a:lnRef>
+          <a:fillRef idx="0">
+            <a:schemeClr val="accent1"/>
+          </a:fillRef>
+          <a:effectRef idx="0">
+            <a:schemeClr val="accent1"/>
+          </a:effectRef>
+          <a:fontRef idx="minor">
+            <a:schemeClr val="tx1"/>
+          </a:fontRef>
+        </p:style>
+      </p:cxnSp>
+      <p:cxnSp>
+        <p:nvCxnSpPr>
+          <p:cNvPr id="17" name="Straight Connector 16">
+            <a:extLst>
+              <a:ext uri="{FF2B5EF4-FFF2-40B4-BE49-F238E27FC236}">
+                <a16:creationId xmlns:a16="http://schemas.microsoft.com/office/drawing/2014/main" id="{A56012FD-74A8-4C91-B318-435CF2B71927}"/>
+              </a:ext>
+              <a:ext uri="{C183D7F6-B498-43B3-948B-1728B52AA6E4}">
+                <adec:decorative xmlns:adec="http://schemas.microsoft.com/office/drawing/2017/decorative" val="1"/>
+              </a:ext>
+            </a:extLst>
+          </p:cNvPr>
+          <p:cNvCxnSpPr>
+            <a:cxnSpLocks noGrp="1" noRot="1" noChangeAspect="1" noMove="1" noResize="1" noEditPoints="1" noAdjustHandles="1" noChangeArrowheads="1" noChangeShapeType="1"/>
+          </p:cNvCxnSpPr>
+          <p:nvPr>
+            <p:extLst>
+              <p:ext uri="{386F3935-93C4-4BCD-93E2-E3B085C9AB24}">
+                <p16:designElem xmlns:p16="http://schemas.microsoft.com/office/powerpoint/2015/main" val="1"/>
+              </p:ext>
+            </p:extLst>
+          </p:nvPr>
+        </p:nvCxnSpPr>
+        <p:spPr>
+          <a:xfrm>
+            <a:off x="1453896" y="1847088"/>
+            <a:ext cx="9607522" cy="0"/>
+          </a:xfrm>
+          <a:prstGeom prst="line">
+            <a:avLst/>
+          </a:prstGeom>
+          <a:ln w="31750"/>
+        </p:spPr>
+        <p:style>
+          <a:lnRef idx="3">
+            <a:schemeClr val="accent1"/>
+          </a:lnRef>
+          <a:fillRef idx="0">
+            <a:schemeClr val="accent1"/>
+          </a:fillRef>
+          <a:effectRef idx="2">
+            <a:schemeClr val="accent1"/>
+          </a:effectRef>
+          <a:fontRef idx="minor">
+            <a:schemeClr val="tx1"/>
+          </a:fontRef>
+        </p:style>
+      </p:cxnSp>
+      <p:sp>
+        <p:nvSpPr>
           <p:cNvPr id="2" name="Title 1">
             <a:extLst>
               <a:ext uri="{FF2B5EF4-FFF2-40B4-BE49-F238E27FC236}">
@@ -3751,22 +3987,29 @@
             <p:ph type="title"/>
           </p:nvPr>
         </p:nvSpPr>
-        <p:spPr/>
+        <p:spPr>
+          <a:xfrm>
+            <a:off x="1451579" y="804519"/>
+            <a:ext cx="9603275" cy="1049235"/>
+          </a:xfrm>
+        </p:spPr>
         <p:txBody>
-          <a:bodyPr/>
+          <a:bodyPr vert="horz" lIns="91440" tIns="45720" rIns="91440" bIns="45720" rtlCol="0" anchor="t">
+            <a:normAutofit/>
+          </a:bodyPr>
           <a:lstStyle/>
           <a:p>
             <a:r>
-              <a:rPr lang="en-US" cap="none" dirty="0"/>
+              <a:rPr lang="en-US" dirty="0"/>
               <a:t>Predictive </a:t>
             </a:r>
             <a:r>
-              <a:rPr lang="en-US" cap="none" dirty="0" err="1"/>
+              <a:rPr lang="en-US" dirty="0" err="1"/>
               <a:t>kNN</a:t>
             </a:r>
             <a:r>
-              <a:rPr lang="en-US" cap="none" dirty="0"/>
-              <a:t> Modeling (Ale vs IPA) – Balaji Slide</a:t>
+              <a:rPr lang="en-US" dirty="0"/>
+              <a:t> Modeling (Ale vs IPA)</a:t>
             </a:r>
           </a:p>
         </p:txBody>
@@ -3787,40 +4030,92 @@
             <p:ph sz="half" idx="1"/>
           </p:nvPr>
         </p:nvSpPr>
-        <p:spPr/>
+        <p:spPr>
+          <a:xfrm>
+            <a:off x="897905" y="2209504"/>
+            <a:ext cx="4162555" cy="3450613"/>
+          </a:xfrm>
+        </p:spPr>
         <p:txBody>
-          <a:bodyPr/>
+          <a:bodyPr vert="horz" lIns="91440" tIns="45720" rIns="91440" bIns="45720" rtlCol="0" anchor="t">
+            <a:normAutofit/>
+          </a:bodyPr>
           <a:lstStyle/>
           <a:p>
-            <a:endParaRPr lang="en-US"/>
+            <a:pPr>
+              <a:buFont typeface="Wingdings" panose="05000000000000000000" pitchFamily="2" charset="2"/>
+              <a:buChar char="v"/>
+            </a:pPr>
+            <a:r>
+              <a:rPr lang="en-US" dirty="0"/>
+              <a:t>Model called K-NN (nearest neighbor)</a:t>
+            </a:r>
+          </a:p>
+          <a:p>
+            <a:pPr>
+              <a:buFont typeface="Wingdings" panose="05000000000000000000" pitchFamily="2" charset="2"/>
+              <a:buChar char="v"/>
+            </a:pPr>
+            <a:r>
+              <a:rPr lang="en-US" dirty="0"/>
+              <a:t>Approximately 36 should give us best accuracy</a:t>
+            </a:r>
+          </a:p>
+          <a:p>
+            <a:pPr>
+              <a:buFont typeface="Wingdings" panose="05000000000000000000" pitchFamily="2" charset="2"/>
+              <a:buChar char="v"/>
+            </a:pPr>
+            <a:r>
+              <a:rPr lang="en-US" dirty="0"/>
+              <a:t>Accuracy of 88.16%</a:t>
+            </a:r>
+          </a:p>
+          <a:p>
+            <a:endParaRPr lang="en-US" dirty="0"/>
+          </a:p>
+          <a:p>
+            <a:endParaRPr lang="en-US" dirty="0"/>
           </a:p>
         </p:txBody>
       </p:sp>
-      <p:sp>
-        <p:nvSpPr>
-          <p:cNvPr id="5" name="Content Placeholder 4">
+      <p:pic>
+        <p:nvPicPr>
+          <p:cNvPr id="6" name="Content Placeholder 5" descr="A screenshot of a map&#10;&#10;Description automatically generated">
             <a:extLst>
               <a:ext uri="{FF2B5EF4-FFF2-40B4-BE49-F238E27FC236}">
-                <a16:creationId xmlns:a16="http://schemas.microsoft.com/office/drawing/2014/main" id="{BB4F4CCF-DE42-466A-9197-1F1B324066A8}"/>
+                <a16:creationId xmlns:a16="http://schemas.microsoft.com/office/drawing/2014/main" id="{29C9849D-A274-4FF8-8E51-56A924A502F4}"/>
               </a:ext>
             </a:extLst>
           </p:cNvPr>
-          <p:cNvSpPr>
-            <a:spLocks noGrp="1"/>
-          </p:cNvSpPr>
+          <p:cNvPicPr>
+            <a:picLocks noGrp="1" noChangeAspect="1"/>
+          </p:cNvPicPr>
           <p:nvPr>
             <p:ph sz="half" idx="2"/>
           </p:nvPr>
-        </p:nvSpPr>
-        <p:spPr/>
-        <p:txBody>
-          <a:bodyPr/>
-          <a:lstStyle/>
-          <a:p>
-            <a:endParaRPr lang="en-US"/>
-          </a:p>
-        </p:txBody>
-      </p:sp>
+        </p:nvPicPr>
+        <p:blipFill>
+          <a:blip r:embed="rId3"/>
+          <a:stretch>
+            <a:fillRect/>
+          </a:stretch>
+        </p:blipFill>
+        <p:spPr>
+          <a:xfrm>
+            <a:off x="6094411" y="2209504"/>
+            <a:ext cx="4960443" cy="3063073"/>
+          </a:xfrm>
+          <a:prstGeom prst="rect">
+            <a:avLst/>
+          </a:prstGeom>
+          <a:ln w="12700">
+            <a:solidFill>
+              <a:schemeClr val="tx1"/>
+            </a:solidFill>
+          </a:ln>
+        </p:spPr>
+      </p:pic>
     </p:spTree>
     <p:extLst>
       <p:ext uri="{BB962C8B-B14F-4D97-AF65-F5344CB8AC3E}">
@@ -3867,15 +4162,21 @@
             <p:ph type="title"/>
           </p:nvPr>
         </p:nvSpPr>
-        <p:spPr/>
+        <p:spPr>
+          <a:xfrm>
+            <a:off x="1449217" y="804889"/>
+            <a:ext cx="9605635" cy="1059305"/>
+          </a:xfrm>
+        </p:spPr>
         <p:txBody>
           <a:bodyPr/>
           <a:lstStyle/>
           <a:p>
             <a:r>
-              <a:rPr lang="en-US" cap="none" dirty="0"/>
+              <a:rPr lang="en-US" cap="none"/>
               <a:t>IPA Recommendations based on ABV</a:t>
             </a:r>
+            <a:endParaRPr lang="en-US" cap="none" dirty="0"/>
           </a:p>
         </p:txBody>
       </p:sp>
@@ -4031,41 +4332,6 @@
           </a:p>
         </p:txBody>
       </p:sp>
-      <p:pic>
-        <p:nvPicPr>
-          <p:cNvPr id="9" name="Picture 8">
-            <a:extLst>
-              <a:ext uri="{FF2B5EF4-FFF2-40B4-BE49-F238E27FC236}">
-                <a16:creationId xmlns:a16="http://schemas.microsoft.com/office/drawing/2014/main" id="{7D02A0AB-A9E8-454F-BBCA-349B2B32BC32}"/>
-              </a:ext>
-            </a:extLst>
-          </p:cNvPr>
-          <p:cNvPicPr>
-            <a:picLocks noChangeAspect="1"/>
-          </p:cNvPicPr>
-          <p:nvPr/>
-        </p:nvPicPr>
-        <p:blipFill>
-          <a:blip r:embed="rId2"/>
-          <a:stretch>
-            <a:fillRect/>
-          </a:stretch>
-        </p:blipFill>
-        <p:spPr>
-          <a:xfrm>
-            <a:off x="3489820" y="2179359"/>
-            <a:ext cx="8400176" cy="3239929"/>
-          </a:xfrm>
-          <a:prstGeom prst="rect">
-            <a:avLst/>
-          </a:prstGeom>
-          <a:ln w="12700">
-            <a:solidFill>
-              <a:schemeClr val="tx1"/>
-            </a:solidFill>
-          </a:ln>
-        </p:spPr>
-      </p:pic>
       <p:graphicFrame>
         <p:nvGraphicFramePr>
           <p:cNvPr id="12" name="Table 12">
@@ -4833,6 +5099,41 @@
           </a:graphicData>
         </a:graphic>
       </p:graphicFrame>
+      <p:pic>
+        <p:nvPicPr>
+          <p:cNvPr id="3" name="Picture 2">
+            <a:extLst>
+              <a:ext uri="{FF2B5EF4-FFF2-40B4-BE49-F238E27FC236}">
+                <a16:creationId xmlns:a16="http://schemas.microsoft.com/office/drawing/2014/main" id="{9664748A-D97D-4173-857F-E26F223351D0}"/>
+              </a:ext>
+            </a:extLst>
+          </p:cNvPr>
+          <p:cNvPicPr>
+            <a:picLocks noChangeAspect="1"/>
+          </p:cNvPicPr>
+          <p:nvPr/>
+        </p:nvPicPr>
+        <p:blipFill>
+          <a:blip r:embed="rId2"/>
+          <a:stretch>
+            <a:fillRect/>
+          </a:stretch>
+        </p:blipFill>
+        <p:spPr>
+          <a:xfrm>
+            <a:off x="3411948" y="2088600"/>
+            <a:ext cx="8679384" cy="3758527"/>
+          </a:xfrm>
+          <a:prstGeom prst="rect">
+            <a:avLst/>
+          </a:prstGeom>
+          <a:ln w="12700">
+            <a:solidFill>
+              <a:schemeClr val="tx1"/>
+            </a:solidFill>
+          </a:ln>
+        </p:spPr>
+      </p:pic>
     </p:spTree>
     <p:extLst>
       <p:ext uri="{BB962C8B-B14F-4D97-AF65-F5344CB8AC3E}">
@@ -4997,41 +5298,6 @@
           </a:p>
         </p:txBody>
       </p:sp>
-      <p:pic>
-        <p:nvPicPr>
-          <p:cNvPr id="4" name="Picture 3">
-            <a:extLst>
-              <a:ext uri="{FF2B5EF4-FFF2-40B4-BE49-F238E27FC236}">
-                <a16:creationId xmlns:a16="http://schemas.microsoft.com/office/drawing/2014/main" id="{4BD9C571-6703-4920-B56B-A3AB3F542E33}"/>
-              </a:ext>
-            </a:extLst>
-          </p:cNvPr>
-          <p:cNvPicPr>
-            <a:picLocks noChangeAspect="1"/>
-          </p:cNvPicPr>
-          <p:nvPr/>
-        </p:nvPicPr>
-        <p:blipFill>
-          <a:blip r:embed="rId2"/>
-          <a:stretch>
-            <a:fillRect/>
-          </a:stretch>
-        </p:blipFill>
-        <p:spPr>
-          <a:xfrm>
-            <a:off x="3556932" y="2130804"/>
-            <a:ext cx="8450509" cy="3389152"/>
-          </a:xfrm>
-          <a:prstGeom prst="rect">
-            <a:avLst/>
-          </a:prstGeom>
-          <a:ln w="12700">
-            <a:solidFill>
-              <a:schemeClr val="tx1"/>
-            </a:solidFill>
-          </a:ln>
-        </p:spPr>
-      </p:pic>
       <p:graphicFrame>
         <p:nvGraphicFramePr>
           <p:cNvPr id="5" name="Table 12">
@@ -5799,6 +6065,41 @@
           </a:graphicData>
         </a:graphic>
       </p:graphicFrame>
+      <p:pic>
+        <p:nvPicPr>
+          <p:cNvPr id="3" name="Picture 2">
+            <a:extLst>
+              <a:ext uri="{FF2B5EF4-FFF2-40B4-BE49-F238E27FC236}">
+                <a16:creationId xmlns:a16="http://schemas.microsoft.com/office/drawing/2014/main" id="{5A0BDE6E-AA25-4E86-B920-6649D85DDFC8}"/>
+              </a:ext>
+            </a:extLst>
+          </p:cNvPr>
+          <p:cNvPicPr>
+            <a:picLocks noChangeAspect="1"/>
+          </p:cNvPicPr>
+          <p:nvPr/>
+        </p:nvPicPr>
+        <p:blipFill>
+          <a:blip r:embed="rId2"/>
+          <a:stretch>
+            <a:fillRect/>
+          </a:stretch>
+        </p:blipFill>
+        <p:spPr>
+          <a:xfrm>
+            <a:off x="3443548" y="2088860"/>
+            <a:ext cx="8580672" cy="3438354"/>
+          </a:xfrm>
+          <a:prstGeom prst="rect">
+            <a:avLst/>
+          </a:prstGeom>
+          <a:ln w="12700">
+            <a:solidFill>
+              <a:schemeClr val="tx1"/>
+            </a:solidFill>
+          </a:ln>
+        </p:spPr>
+      </p:pic>
     </p:spTree>
     <p:extLst>
       <p:ext uri="{BB962C8B-B14F-4D97-AF65-F5344CB8AC3E}">
@@ -5857,41 +6158,6 @@
           </a:p>
         </p:txBody>
       </p:sp>
-      <p:pic>
-        <p:nvPicPr>
-          <p:cNvPr id="4" name="Picture 3">
-            <a:extLst>
-              <a:ext uri="{FF2B5EF4-FFF2-40B4-BE49-F238E27FC236}">
-                <a16:creationId xmlns:a16="http://schemas.microsoft.com/office/drawing/2014/main" id="{372C3579-75C1-4310-AB5C-4DB0DDEA91A5}"/>
-              </a:ext>
-            </a:extLst>
-          </p:cNvPr>
-          <p:cNvPicPr>
-            <a:picLocks noChangeAspect="1"/>
-          </p:cNvPicPr>
-          <p:nvPr/>
-        </p:nvPicPr>
-        <p:blipFill>
-          <a:blip r:embed="rId2"/>
-          <a:stretch>
-            <a:fillRect/>
-          </a:stretch>
-        </p:blipFill>
-        <p:spPr>
-          <a:xfrm>
-            <a:off x="3514987" y="2090833"/>
-            <a:ext cx="8383398" cy="3456144"/>
-          </a:xfrm>
-          <a:prstGeom prst="rect">
-            <a:avLst/>
-          </a:prstGeom>
-          <a:ln w="12700">
-            <a:solidFill>
-              <a:schemeClr val="tx1"/>
-            </a:solidFill>
-          </a:ln>
-        </p:spPr>
-      </p:pic>
       <p:graphicFrame>
         <p:nvGraphicFramePr>
           <p:cNvPr id="5" name="Table 12">
@@ -6659,6 +6925,41 @@
           </a:graphicData>
         </a:graphic>
       </p:graphicFrame>
+      <p:pic>
+        <p:nvPicPr>
+          <p:cNvPr id="3" name="Picture 2">
+            <a:extLst>
+              <a:ext uri="{FF2B5EF4-FFF2-40B4-BE49-F238E27FC236}">
+                <a16:creationId xmlns:a16="http://schemas.microsoft.com/office/drawing/2014/main" id="{2AC73C31-9138-4C36-AFB7-DD838747DB3E}"/>
+              </a:ext>
+            </a:extLst>
+          </p:cNvPr>
+          <p:cNvPicPr>
+            <a:picLocks noChangeAspect="1"/>
+          </p:cNvPicPr>
+          <p:nvPr/>
+        </p:nvPicPr>
+        <p:blipFill>
+          <a:blip r:embed="rId2"/>
+          <a:stretch>
+            <a:fillRect/>
+          </a:stretch>
+        </p:blipFill>
+        <p:spPr>
+          <a:xfrm>
+            <a:off x="3473042" y="2091008"/>
+            <a:ext cx="8581938" cy="3506916"/>
+          </a:xfrm>
+          <a:prstGeom prst="rect">
+            <a:avLst/>
+          </a:prstGeom>
+          <a:ln w="12700">
+            <a:solidFill>
+              <a:schemeClr val="tx1"/>
+            </a:solidFill>
+          </a:ln>
+        </p:spPr>
+      </p:pic>
     </p:spTree>
     <p:extLst>
       <p:ext uri="{BB962C8B-B14F-4D97-AF65-F5344CB8AC3E}">
@@ -6717,41 +7018,6 @@
           </a:p>
         </p:txBody>
       </p:sp>
-      <p:pic>
-        <p:nvPicPr>
-          <p:cNvPr id="4" name="Picture 3">
-            <a:extLst>
-              <a:ext uri="{FF2B5EF4-FFF2-40B4-BE49-F238E27FC236}">
-                <a16:creationId xmlns:a16="http://schemas.microsoft.com/office/drawing/2014/main" id="{37E71699-3AE6-4F6B-8AEC-15379BBDE18B}"/>
-              </a:ext>
-            </a:extLst>
-          </p:cNvPr>
-          <p:cNvPicPr>
-            <a:picLocks noChangeAspect="1"/>
-          </p:cNvPicPr>
-          <p:nvPr/>
-        </p:nvPicPr>
-        <p:blipFill>
-          <a:blip r:embed="rId2"/>
-          <a:stretch>
-            <a:fillRect/>
-          </a:stretch>
-        </p:blipFill>
-        <p:spPr>
-          <a:xfrm>
-            <a:off x="2533213" y="1904088"/>
-            <a:ext cx="9648040" cy="4199727"/>
-          </a:xfrm>
-          <a:prstGeom prst="rect">
-            <a:avLst/>
-          </a:prstGeom>
-          <a:ln w="12700">
-            <a:solidFill>
-              <a:schemeClr val="tx1"/>
-            </a:solidFill>
-          </a:ln>
-        </p:spPr>
-      </p:pic>
       <p:graphicFrame>
         <p:nvGraphicFramePr>
           <p:cNvPr id="5" name="Table 12">
@@ -7609,6 +7875,41 @@
           </a:graphicData>
         </a:graphic>
       </p:graphicFrame>
+      <p:pic>
+        <p:nvPicPr>
+          <p:cNvPr id="3" name="Picture 2">
+            <a:extLst>
+              <a:ext uri="{FF2B5EF4-FFF2-40B4-BE49-F238E27FC236}">
+                <a16:creationId xmlns:a16="http://schemas.microsoft.com/office/drawing/2014/main" id="{C70D54DE-D47E-4DE1-9CA9-558151D467A0}"/>
+              </a:ext>
+            </a:extLst>
+          </p:cNvPr>
+          <p:cNvPicPr>
+            <a:picLocks noChangeAspect="1"/>
+          </p:cNvPicPr>
+          <p:nvPr/>
+        </p:nvPicPr>
+        <p:blipFill>
+          <a:blip r:embed="rId2"/>
+          <a:stretch>
+            <a:fillRect/>
+          </a:stretch>
+        </p:blipFill>
+        <p:spPr>
+          <a:xfrm>
+            <a:off x="2491530" y="1929468"/>
+            <a:ext cx="9666914" cy="4124013"/>
+          </a:xfrm>
+          <a:prstGeom prst="rect">
+            <a:avLst/>
+          </a:prstGeom>
+          <a:ln w="12700">
+            <a:solidFill>
+              <a:schemeClr val="tx1"/>
+            </a:solidFill>
+          </a:ln>
+        </p:spPr>
+      </p:pic>
     </p:spTree>
     <p:extLst>
       <p:ext uri="{BB962C8B-B14F-4D97-AF65-F5344CB8AC3E}">
@@ -7667,41 +7968,6 @@
           </a:p>
         </p:txBody>
       </p:sp>
-      <p:pic>
-        <p:nvPicPr>
-          <p:cNvPr id="5" name="Picture 4">
-            <a:extLst>
-              <a:ext uri="{FF2B5EF4-FFF2-40B4-BE49-F238E27FC236}">
-                <a16:creationId xmlns:a16="http://schemas.microsoft.com/office/drawing/2014/main" id="{9FDCDA4B-1537-4C00-9B26-CF572D5C6135}"/>
-              </a:ext>
-            </a:extLst>
-          </p:cNvPr>
-          <p:cNvPicPr>
-            <a:picLocks noChangeAspect="1"/>
-          </p:cNvPicPr>
-          <p:nvPr/>
-        </p:nvPicPr>
-        <p:blipFill>
-          <a:blip r:embed="rId2"/>
-          <a:stretch>
-            <a:fillRect/>
-          </a:stretch>
-        </p:blipFill>
-        <p:spPr>
-          <a:xfrm>
-            <a:off x="2571947" y="1895698"/>
-            <a:ext cx="9603275" cy="4199727"/>
-          </a:xfrm>
-          <a:prstGeom prst="rect">
-            <a:avLst/>
-          </a:prstGeom>
-          <a:ln w="12700">
-            <a:solidFill>
-              <a:schemeClr val="tx1"/>
-            </a:solidFill>
-          </a:ln>
-        </p:spPr>
-      </p:pic>
       <p:graphicFrame>
         <p:nvGraphicFramePr>
           <p:cNvPr id="6" name="Table 12">
@@ -8559,6 +8825,41 @@
           </a:graphicData>
         </a:graphic>
       </p:graphicFrame>
+      <p:pic>
+        <p:nvPicPr>
+          <p:cNvPr id="3" name="Picture 2">
+            <a:extLst>
+              <a:ext uri="{FF2B5EF4-FFF2-40B4-BE49-F238E27FC236}">
+                <a16:creationId xmlns:a16="http://schemas.microsoft.com/office/drawing/2014/main" id="{18C8CED6-E489-4397-BEF0-60ADC1C5032B}"/>
+              </a:ext>
+            </a:extLst>
+          </p:cNvPr>
+          <p:cNvPicPr>
+            <a:picLocks noChangeAspect="1"/>
+          </p:cNvPicPr>
+          <p:nvPr/>
+        </p:nvPicPr>
+        <p:blipFill>
+          <a:blip r:embed="rId2"/>
+          <a:stretch>
+            <a:fillRect/>
+          </a:stretch>
+        </p:blipFill>
+        <p:spPr>
+          <a:xfrm>
+            <a:off x="2557230" y="1916407"/>
+            <a:ext cx="9601214" cy="4137074"/>
+          </a:xfrm>
+          <a:prstGeom prst="rect">
+            <a:avLst/>
+          </a:prstGeom>
+          <a:ln w="12700">
+            <a:solidFill>
+              <a:schemeClr val="tx1"/>
+            </a:solidFill>
+          </a:ln>
+        </p:spPr>
+      </p:pic>
     </p:spTree>
     <p:extLst>
       <p:ext uri="{BB962C8B-B14F-4D97-AF65-F5344CB8AC3E}">
@@ -9672,6 +9973,11 @@
           <a:prstGeom prst="rect">
             <a:avLst/>
           </a:prstGeom>
+          <a:ln w="12700">
+            <a:solidFill>
+              <a:schemeClr val="tx1"/>
+            </a:solidFill>
+          </a:ln>
         </p:spPr>
       </p:pic>
     </p:spTree>
@@ -9762,6 +10068,11 @@
           <a:prstGeom prst="rect">
             <a:avLst/>
           </a:prstGeom>
+          <a:ln w="12700">
+            <a:solidFill>
+              <a:schemeClr val="tx1"/>
+            </a:solidFill>
+          </a:ln>
         </p:spPr>
       </p:pic>
       <p:sp>
@@ -9793,8 +10104,8 @@
           <a:lstStyle/>
           <a:p>
             <a:pPr marL="285750" indent="-285750">
-              <a:buFont typeface="Arial" panose="020B0604020202020204" pitchFamily="34" charset="0"/>
-              <a:buChar char="•"/>
+              <a:buFont typeface="Wingdings" panose="05000000000000000000" pitchFamily="2" charset="2"/>
+              <a:buChar char="v"/>
             </a:pPr>
             <a:r>
               <a:rPr lang="en-US" dirty="0"/>
@@ -9803,8 +10114,8 @@
           </a:p>
           <a:p>
             <a:pPr marL="285750" indent="-285750">
-              <a:buFont typeface="Arial" panose="020B0604020202020204" pitchFamily="34" charset="0"/>
-              <a:buChar char="•"/>
+              <a:buFont typeface="Wingdings" panose="05000000000000000000" pitchFamily="2" charset="2"/>
+              <a:buChar char="v"/>
             </a:pPr>
             <a:r>
               <a:rPr lang="en-US" dirty="0"/>

</xml_diff>

<commit_message>
Final additions. Styling changes
</commit_message>
<xml_diff>
--- a/PPT/Case_Study_Analysis_DDS6306.pptx
+++ b/PPT/Case_Study_Analysis_DDS6306.pptx
@@ -13,7 +13,7 @@
     <p:sldId id="261" r:id="rId7"/>
     <p:sldId id="262" r:id="rId8"/>
     <p:sldId id="263" r:id="rId9"/>
-    <p:sldId id="264" r:id="rId10"/>
+    <p:sldId id="267" r:id="rId10"/>
     <p:sldId id="265" r:id="rId11"/>
     <p:sldId id="266" r:id="rId12"/>
   </p:sldIdLst>
@@ -261,7 +261,7 @@
           <a:p>
             <a:fld id="{54DE4EA5-D626-4B22-BD71-66DAAEC9E505}" type="datetimeFigureOut">
               <a:rPr lang="en-US" smtClean="0"/>
-              <a:t>2/27/2020</a:t>
+              <a:t>3/1/2020</a:t>
             </a:fld>
             <a:endParaRPr lang="en-US"/>
           </a:p>
@@ -472,7 +472,7 @@
           <a:p>
             <a:fld id="{54DE4EA5-D626-4B22-BD71-66DAAEC9E505}" type="datetimeFigureOut">
               <a:rPr lang="en-US" smtClean="0"/>
-              <a:t>2/27/2020</a:t>
+              <a:t>3/1/2020</a:t>
             </a:fld>
             <a:endParaRPr lang="en-US"/>
           </a:p>
@@ -687,7 +687,7 @@
           <a:p>
             <a:fld id="{54DE4EA5-D626-4B22-BD71-66DAAEC9E505}" type="datetimeFigureOut">
               <a:rPr lang="en-US" smtClean="0"/>
-              <a:t>2/27/2020</a:t>
+              <a:t>3/1/2020</a:t>
             </a:fld>
             <a:endParaRPr lang="en-US"/>
           </a:p>
@@ -888,7 +888,7 @@
           <a:p>
             <a:fld id="{54DE4EA5-D626-4B22-BD71-66DAAEC9E505}" type="datetimeFigureOut">
               <a:rPr lang="en-US" smtClean="0"/>
-              <a:t>2/27/2020</a:t>
+              <a:t>3/1/2020</a:t>
             </a:fld>
             <a:endParaRPr lang="en-US"/>
           </a:p>
@@ -1167,7 +1167,7 @@
           <a:p>
             <a:fld id="{54DE4EA5-D626-4B22-BD71-66DAAEC9E505}" type="datetimeFigureOut">
               <a:rPr lang="en-US" smtClean="0"/>
-              <a:t>2/27/2020</a:t>
+              <a:t>3/1/2020</a:t>
             </a:fld>
             <a:endParaRPr lang="en-US"/>
           </a:p>
@@ -1435,7 +1435,7 @@
           <a:p>
             <a:fld id="{54DE4EA5-D626-4B22-BD71-66DAAEC9E505}" type="datetimeFigureOut">
               <a:rPr lang="en-US" smtClean="0"/>
-              <a:t>2/27/2020</a:t>
+              <a:t>3/1/2020</a:t>
             </a:fld>
             <a:endParaRPr lang="en-US"/>
           </a:p>
@@ -1851,7 +1851,7 @@
           <a:p>
             <a:fld id="{54DE4EA5-D626-4B22-BD71-66DAAEC9E505}" type="datetimeFigureOut">
               <a:rPr lang="en-US" smtClean="0"/>
-              <a:t>2/27/2020</a:t>
+              <a:t>3/1/2020</a:t>
             </a:fld>
             <a:endParaRPr lang="en-US"/>
           </a:p>
@@ -2000,7 +2000,7 @@
           <a:p>
             <a:fld id="{54DE4EA5-D626-4B22-BD71-66DAAEC9E505}" type="datetimeFigureOut">
               <a:rPr lang="en-US" smtClean="0"/>
-              <a:t>2/27/2020</a:t>
+              <a:t>3/1/2020</a:t>
             </a:fld>
             <a:endParaRPr lang="en-US"/>
           </a:p>
@@ -2126,7 +2126,7 @@
           <a:p>
             <a:fld id="{54DE4EA5-D626-4B22-BD71-66DAAEC9E505}" type="datetimeFigureOut">
               <a:rPr lang="en-US" smtClean="0"/>
-              <a:t>2/27/2020</a:t>
+              <a:t>3/1/2020</a:t>
             </a:fld>
             <a:endParaRPr lang="en-US"/>
           </a:p>
@@ -2377,7 +2377,7 @@
           <a:p>
             <a:fld id="{54DE4EA5-D626-4B22-BD71-66DAAEC9E505}" type="datetimeFigureOut">
               <a:rPr lang="en-US" smtClean="0"/>
-              <a:t>2/27/2020</a:t>
+              <a:t>3/1/2020</a:t>
             </a:fld>
             <a:endParaRPr lang="en-US"/>
           </a:p>
@@ -2822,7 +2822,7 @@
           <a:p>
             <a:fld id="{54DE4EA5-D626-4B22-BD71-66DAAEC9E505}" type="datetimeFigureOut">
               <a:rPr lang="en-US" smtClean="0"/>
-              <a:t>2/27/2020</a:t>
+              <a:t>3/1/2020</a:t>
             </a:fld>
             <a:endParaRPr lang="en-US"/>
           </a:p>
@@ -3149,7 +3149,7 @@
           <a:p>
             <a:fld id="{54DE4EA5-D626-4B22-BD71-66DAAEC9E505}" type="datetimeFigureOut">
               <a:rPr lang="en-US" smtClean="0"/>
-              <a:t>2/27/2020</a:t>
+              <a:t>3/1/2020</a:t>
             </a:fld>
             <a:endParaRPr lang="en-US"/>
           </a:p>
@@ -4032,8 +4032,8 @@
         </p:nvSpPr>
         <p:spPr>
           <a:xfrm>
-            <a:off x="897905" y="2209504"/>
-            <a:ext cx="4162555" cy="3450613"/>
+            <a:off x="369398" y="2209504"/>
+            <a:ext cx="4587867" cy="3450613"/>
           </a:xfrm>
         </p:spPr>
         <p:txBody>
@@ -4208,30 +4208,50 @@
           </a:bodyPr>
           <a:lstStyle/>
           <a:p>
+            <a:pPr>
+              <a:buFont typeface="Wingdings" panose="05000000000000000000" pitchFamily="2" charset="2"/>
+              <a:buChar char="v"/>
+            </a:pPr>
             <a:r>
               <a:rPr lang="en-US" dirty="0"/>
               <a:t>We ran a test to see if the mean ABV was different in IPA vs Other Ale’s</a:t>
             </a:r>
           </a:p>
           <a:p>
+            <a:pPr>
+              <a:buFont typeface="Wingdings" panose="05000000000000000000" pitchFamily="2" charset="2"/>
+              <a:buChar char="v"/>
+            </a:pPr>
             <a:r>
               <a:rPr lang="en-US" dirty="0"/>
               <a:t>We found strong evidence that IPA’s have about 1.1%-1.4% more ABV</a:t>
             </a:r>
           </a:p>
           <a:p>
+            <a:pPr>
+              <a:buFont typeface="Wingdings" panose="05000000000000000000" pitchFamily="2" charset="2"/>
+              <a:buChar char="v"/>
+            </a:pPr>
             <a:r>
               <a:rPr lang="en-US" dirty="0"/>
               <a:t>Heat Map to the right shows states that prefer higher ABV content</a:t>
             </a:r>
           </a:p>
           <a:p>
+            <a:pPr>
+              <a:buFont typeface="Wingdings" panose="05000000000000000000" pitchFamily="2" charset="2"/>
+              <a:buChar char="v"/>
+            </a:pPr>
             <a:r>
               <a:rPr lang="en-US" dirty="0"/>
               <a:t>Suggestion: Target higher ABV areas to produce more IPA’s to increase sales</a:t>
             </a:r>
           </a:p>
           <a:p>
+            <a:pPr>
+              <a:buFont typeface="Wingdings" panose="05000000000000000000" pitchFamily="2" charset="2"/>
+              <a:buChar char="v"/>
+            </a:pPr>
             <a:r>
               <a:rPr lang="en-US" dirty="0"/>
               <a:t>Top 3: Texas, South Carolina, Virginia</a:t>
@@ -4267,6 +4287,11 @@
           <a:prstGeom prst="rect">
             <a:avLst/>
           </a:prstGeom>
+          <a:ln w="12700">
+            <a:solidFill>
+              <a:schemeClr val="tx1"/>
+            </a:solidFill>
+          </a:ln>
         </p:spPr>
       </p:pic>
     </p:spTree>
@@ -5213,26 +5238,40 @@
           <a:bodyPr/>
           <a:lstStyle/>
           <a:p>
+            <a:pPr>
+              <a:buFont typeface="Wingdings" panose="05000000000000000000" pitchFamily="2" charset="2"/>
+              <a:buChar char="v"/>
+            </a:pPr>
             <a:r>
               <a:rPr lang="en-US" dirty="0"/>
               <a:t>Beers containing missing values were filtered from the data set for analysis</a:t>
             </a:r>
           </a:p>
           <a:p>
+            <a:pPr>
+              <a:buFont typeface="Wingdings" panose="05000000000000000000" pitchFamily="2" charset="2"/>
+              <a:buChar char="v"/>
+            </a:pPr>
             <a:r>
               <a:rPr lang="en-US" dirty="0"/>
               <a:t>Only columns ABV and IBU contained missing values</a:t>
             </a:r>
           </a:p>
           <a:p>
-            <a:pPr lvl="1"/>
+            <a:pPr lvl="1">
+              <a:buFont typeface="Wingdings" panose="05000000000000000000" pitchFamily="2" charset="2"/>
+              <a:buChar char="v"/>
+            </a:pPr>
             <a:r>
               <a:rPr lang="en-US" dirty="0"/>
               <a:t>ABV: 62 missing, about 2.6% of the data</a:t>
             </a:r>
           </a:p>
           <a:p>
-            <a:pPr lvl="1"/>
+            <a:pPr lvl="1">
+              <a:buFont typeface="Wingdings" panose="05000000000000000000" pitchFamily="2" charset="2"/>
+              <a:buChar char="v"/>
+            </a:pPr>
             <a:r>
               <a:rPr lang="en-US" dirty="0"/>
               <a:t>IBU: 1005 missing, about 41.7% of the data</a:t>
@@ -10015,7 +10054,7 @@
           <p:cNvPr id="2" name="Title 1">
             <a:extLst>
               <a:ext uri="{FF2B5EF4-FFF2-40B4-BE49-F238E27FC236}">
-                <a16:creationId xmlns:a16="http://schemas.microsoft.com/office/drawing/2014/main" id="{7E063D2A-F8E6-4530-8F33-96641FD3927A}"/>
+                <a16:creationId xmlns:a16="http://schemas.microsoft.com/office/drawing/2014/main" id="{51881777-4C78-448B-A61D-AC87D4717357}"/>
               </a:ext>
             </a:extLst>
           </p:cNvPr>
@@ -10035,6 +10074,61 @@
               <a:rPr lang="en-US" cap="none" dirty="0"/>
               <a:t>IBU vs ABV Relationship</a:t>
             </a:r>
+            <a:endParaRPr lang="en-US" dirty="0"/>
+          </a:p>
+        </p:txBody>
+      </p:sp>
+      <p:sp>
+        <p:nvSpPr>
+          <p:cNvPr id="3" name="Content Placeholder 2">
+            <a:extLst>
+              <a:ext uri="{FF2B5EF4-FFF2-40B4-BE49-F238E27FC236}">
+                <a16:creationId xmlns:a16="http://schemas.microsoft.com/office/drawing/2014/main" id="{DB6F86E9-AC1E-454B-BB46-84BA0122354B}"/>
+              </a:ext>
+            </a:extLst>
+          </p:cNvPr>
+          <p:cNvSpPr>
+            <a:spLocks noGrp="1"/>
+          </p:cNvSpPr>
+          <p:nvPr>
+            <p:ph idx="1"/>
+          </p:nvPr>
+        </p:nvSpPr>
+        <p:spPr>
+          <a:xfrm>
+            <a:off x="361010" y="2582899"/>
+            <a:ext cx="4471049" cy="1692202"/>
+          </a:xfrm>
+        </p:spPr>
+        <p:txBody>
+          <a:bodyPr/>
+          <a:lstStyle/>
+          <a:p>
+            <a:pPr marL="285750" indent="-285750">
+              <a:buFont typeface="Wingdings" panose="05000000000000000000" pitchFamily="2" charset="2"/>
+              <a:buChar char="v"/>
+            </a:pPr>
+            <a:r>
+              <a:rPr lang="en-US" sz="1800" dirty="0"/>
+              <a:t>Positive linear correlation between IBU and ABV</a:t>
+            </a:r>
+          </a:p>
+          <a:p>
+            <a:pPr marL="285750" indent="-285750">
+              <a:buFont typeface="Wingdings" panose="05000000000000000000" pitchFamily="2" charset="2"/>
+              <a:buChar char="v"/>
+            </a:pPr>
+            <a:r>
+              <a:rPr lang="en-US" sz="1800" dirty="0"/>
+              <a:t>As bitterness increases, the ABV tends to increase slightly</a:t>
+            </a:r>
+          </a:p>
+          <a:p>
+            <a:pPr>
+              <a:buFont typeface="Wingdings" panose="05000000000000000000" pitchFamily="2" charset="2"/>
+              <a:buChar char="v"/>
+            </a:pPr>
+            <a:endParaRPr lang="en-US" dirty="0"/>
           </a:p>
         </p:txBody>
       </p:sp>
@@ -10043,16 +10137,14 @@
           <p:cNvPr id="4" name="Content Placeholder 3">
             <a:extLst>
               <a:ext uri="{FF2B5EF4-FFF2-40B4-BE49-F238E27FC236}">
-                <a16:creationId xmlns:a16="http://schemas.microsoft.com/office/drawing/2014/main" id="{D5F02277-F875-4BA4-85BD-C9917BBA072A}"/>
+                <a16:creationId xmlns:a16="http://schemas.microsoft.com/office/drawing/2014/main" id="{22C2C945-E9A6-427F-B6FA-9A90711B1ACE}"/>
               </a:ext>
             </a:extLst>
           </p:cNvPr>
           <p:cNvPicPr>
-            <a:picLocks noGrp="1" noChangeAspect="1"/>
+            <a:picLocks noChangeAspect="1"/>
           </p:cNvPicPr>
-          <p:nvPr>
-            <p:ph idx="1"/>
-          </p:nvPr>
+          <p:nvPr/>
         </p:nvPicPr>
         <p:blipFill>
           <a:blip r:embed="rId2"/>
@@ -10062,7 +10154,7 @@
         </p:blipFill>
         <p:spPr>
           <a:xfrm>
-            <a:off x="4514648" y="2251873"/>
+            <a:off x="4832059" y="2158567"/>
             <a:ext cx="6540206" cy="3449638"/>
           </a:xfrm>
           <a:prstGeom prst="rect">
@@ -10075,59 +10167,10 @@
           </a:ln>
         </p:spPr>
       </p:pic>
-      <p:sp>
-        <p:nvSpPr>
-          <p:cNvPr id="5" name="TextBox 4">
-            <a:extLst>
-              <a:ext uri="{FF2B5EF4-FFF2-40B4-BE49-F238E27FC236}">
-                <a16:creationId xmlns:a16="http://schemas.microsoft.com/office/drawing/2014/main" id="{EAED369C-7381-4853-90B9-AA29C7847B78}"/>
-              </a:ext>
-            </a:extLst>
-          </p:cNvPr>
-          <p:cNvSpPr txBox="1"/>
-          <p:nvPr/>
-        </p:nvSpPr>
-        <p:spPr>
-          <a:xfrm>
-            <a:off x="268449" y="2828835"/>
-            <a:ext cx="4025516" cy="1200329"/>
-          </a:xfrm>
-          <a:prstGeom prst="rect">
-            <a:avLst/>
-          </a:prstGeom>
-          <a:noFill/>
-        </p:spPr>
-        <p:txBody>
-          <a:bodyPr wrap="square" rtlCol="0">
-            <a:spAutoFit/>
-          </a:bodyPr>
-          <a:lstStyle/>
-          <a:p>
-            <a:pPr marL="285750" indent="-285750">
-              <a:buFont typeface="Wingdings" panose="05000000000000000000" pitchFamily="2" charset="2"/>
-              <a:buChar char="v"/>
-            </a:pPr>
-            <a:r>
-              <a:rPr lang="en-US" dirty="0"/>
-              <a:t>Positive linear correlation between IBU and ABV</a:t>
-            </a:r>
-          </a:p>
-          <a:p>
-            <a:pPr marL="285750" indent="-285750">
-              <a:buFont typeface="Wingdings" panose="05000000000000000000" pitchFamily="2" charset="2"/>
-              <a:buChar char="v"/>
-            </a:pPr>
-            <a:r>
-              <a:rPr lang="en-US" dirty="0"/>
-              <a:t>As bitterness increases, the ABV tends to increase slightly</a:t>
-            </a:r>
-          </a:p>
-        </p:txBody>
-      </p:sp>
     </p:spTree>
     <p:extLst>
       <p:ext uri="{BB962C8B-B14F-4D97-AF65-F5344CB8AC3E}">
-        <p14:creationId xmlns:p14="http://schemas.microsoft.com/office/powerpoint/2010/main" val="1865811079"/>
+        <p14:creationId xmlns:p14="http://schemas.microsoft.com/office/powerpoint/2010/main" val="3534215694"/>
       </p:ext>
     </p:extLst>
   </p:cSld>

</xml_diff>

<commit_message>
Fixed some labeling issues
</commit_message>
<xml_diff>
--- a/PPT/Case_Study_Analysis_DDS6306.pptx
+++ b/PPT/Case_Study_Analysis_DDS6306.pptx
@@ -261,7 +261,7 @@
           <a:p>
             <a:fld id="{54DE4EA5-D626-4B22-BD71-66DAAEC9E505}" type="datetimeFigureOut">
               <a:rPr lang="en-US" smtClean="0"/>
-              <a:t>3/1/2020</a:t>
+              <a:t>3/4/2020</a:t>
             </a:fld>
             <a:endParaRPr lang="en-US"/>
           </a:p>
@@ -472,7 +472,7 @@
           <a:p>
             <a:fld id="{54DE4EA5-D626-4B22-BD71-66DAAEC9E505}" type="datetimeFigureOut">
               <a:rPr lang="en-US" smtClean="0"/>
-              <a:t>3/1/2020</a:t>
+              <a:t>3/4/2020</a:t>
             </a:fld>
             <a:endParaRPr lang="en-US"/>
           </a:p>
@@ -687,7 +687,7 @@
           <a:p>
             <a:fld id="{54DE4EA5-D626-4B22-BD71-66DAAEC9E505}" type="datetimeFigureOut">
               <a:rPr lang="en-US" smtClean="0"/>
-              <a:t>3/1/2020</a:t>
+              <a:t>3/4/2020</a:t>
             </a:fld>
             <a:endParaRPr lang="en-US"/>
           </a:p>
@@ -888,7 +888,7 @@
           <a:p>
             <a:fld id="{54DE4EA5-D626-4B22-BD71-66DAAEC9E505}" type="datetimeFigureOut">
               <a:rPr lang="en-US" smtClean="0"/>
-              <a:t>3/1/2020</a:t>
+              <a:t>3/4/2020</a:t>
             </a:fld>
             <a:endParaRPr lang="en-US"/>
           </a:p>
@@ -1167,7 +1167,7 @@
           <a:p>
             <a:fld id="{54DE4EA5-D626-4B22-BD71-66DAAEC9E505}" type="datetimeFigureOut">
               <a:rPr lang="en-US" smtClean="0"/>
-              <a:t>3/1/2020</a:t>
+              <a:t>3/4/2020</a:t>
             </a:fld>
             <a:endParaRPr lang="en-US"/>
           </a:p>
@@ -1435,7 +1435,7 @@
           <a:p>
             <a:fld id="{54DE4EA5-D626-4B22-BD71-66DAAEC9E505}" type="datetimeFigureOut">
               <a:rPr lang="en-US" smtClean="0"/>
-              <a:t>3/1/2020</a:t>
+              <a:t>3/4/2020</a:t>
             </a:fld>
             <a:endParaRPr lang="en-US"/>
           </a:p>
@@ -1851,7 +1851,7 @@
           <a:p>
             <a:fld id="{54DE4EA5-D626-4B22-BD71-66DAAEC9E505}" type="datetimeFigureOut">
               <a:rPr lang="en-US" smtClean="0"/>
-              <a:t>3/1/2020</a:t>
+              <a:t>3/4/2020</a:t>
             </a:fld>
             <a:endParaRPr lang="en-US"/>
           </a:p>
@@ -2000,7 +2000,7 @@
           <a:p>
             <a:fld id="{54DE4EA5-D626-4B22-BD71-66DAAEC9E505}" type="datetimeFigureOut">
               <a:rPr lang="en-US" smtClean="0"/>
-              <a:t>3/1/2020</a:t>
+              <a:t>3/4/2020</a:t>
             </a:fld>
             <a:endParaRPr lang="en-US"/>
           </a:p>
@@ -2126,7 +2126,7 @@
           <a:p>
             <a:fld id="{54DE4EA5-D626-4B22-BD71-66DAAEC9E505}" type="datetimeFigureOut">
               <a:rPr lang="en-US" smtClean="0"/>
-              <a:t>3/1/2020</a:t>
+              <a:t>3/4/2020</a:t>
             </a:fld>
             <a:endParaRPr lang="en-US"/>
           </a:p>
@@ -2377,7 +2377,7 @@
           <a:p>
             <a:fld id="{54DE4EA5-D626-4B22-BD71-66DAAEC9E505}" type="datetimeFigureOut">
               <a:rPr lang="en-US" smtClean="0"/>
-              <a:t>3/1/2020</a:t>
+              <a:t>3/4/2020</a:t>
             </a:fld>
             <a:endParaRPr lang="en-US"/>
           </a:p>
@@ -2822,7 +2822,7 @@
           <a:p>
             <a:fld id="{54DE4EA5-D626-4B22-BD71-66DAAEC9E505}" type="datetimeFigureOut">
               <a:rPr lang="en-US" smtClean="0"/>
-              <a:t>3/1/2020</a:t>
+              <a:t>3/4/2020</a:t>
             </a:fld>
             <a:endParaRPr lang="en-US"/>
           </a:p>
@@ -3149,7 +3149,7 @@
           <a:p>
             <a:fld id="{54DE4EA5-D626-4B22-BD71-66DAAEC9E505}" type="datetimeFigureOut">
               <a:rPr lang="en-US" smtClean="0"/>
-              <a:t>3/1/2020</a:t>
+              <a:t>3/4/2020</a:t>
             </a:fld>
             <a:endParaRPr lang="en-US"/>
           </a:p>
@@ -4058,7 +4058,7 @@
             </a:pPr>
             <a:r>
               <a:rPr lang="en-US" dirty="0"/>
-              <a:t>Approximately 36 should give us best accuracy</a:t>
+              <a:t>Approximately k=36 should give us best accuracy</a:t>
             </a:r>
           </a:p>
           <a:p>
@@ -4081,10 +4081,10 @@
       </p:sp>
       <p:pic>
         <p:nvPicPr>
-          <p:cNvPr id="6" name="Content Placeholder 5" descr="A screenshot of a map&#10;&#10;Description automatically generated">
+          <p:cNvPr id="10" name="Content Placeholder 9">
             <a:extLst>
               <a:ext uri="{FF2B5EF4-FFF2-40B4-BE49-F238E27FC236}">
-                <a16:creationId xmlns:a16="http://schemas.microsoft.com/office/drawing/2014/main" id="{29C9849D-A274-4FF8-8E51-56A924A502F4}"/>
+                <a16:creationId xmlns:a16="http://schemas.microsoft.com/office/drawing/2014/main" id="{71033BCE-A771-4ADA-8C99-7D28B1C63D87}"/>
               </a:ext>
             </a:extLst>
           </p:cNvPr>
@@ -4103,8 +4103,8 @@
         </p:blipFill>
         <p:spPr>
           <a:xfrm>
-            <a:off x="6094411" y="2209504"/>
-            <a:ext cx="4960443" cy="3063073"/>
+            <a:off x="5329556" y="2209504"/>
+            <a:ext cx="5731862" cy="3175960"/>
           </a:xfrm>
           <a:prstGeom prst="rect">
             <a:avLst/>

</xml_diff>

<commit_message>
Added Intro and Conclusion PPT slides
</commit_message>
<xml_diff>
--- a/PPT/Case_Study_Analysis_DDS6306.pptx
+++ b/PPT/Case_Study_Analysis_DDS6306.pptx
@@ -6,16 +6,18 @@
   </p:sldMasterIdLst>
   <p:sldIdLst>
     <p:sldId id="256" r:id="rId2"/>
-    <p:sldId id="257" r:id="rId3"/>
-    <p:sldId id="258" r:id="rId4"/>
-    <p:sldId id="259" r:id="rId5"/>
-    <p:sldId id="260" r:id="rId6"/>
-    <p:sldId id="261" r:id="rId7"/>
-    <p:sldId id="262" r:id="rId8"/>
-    <p:sldId id="263" r:id="rId9"/>
-    <p:sldId id="267" r:id="rId10"/>
-    <p:sldId id="265" r:id="rId11"/>
-    <p:sldId id="266" r:id="rId12"/>
+    <p:sldId id="268" r:id="rId3"/>
+    <p:sldId id="257" r:id="rId4"/>
+    <p:sldId id="258" r:id="rId5"/>
+    <p:sldId id="259" r:id="rId6"/>
+    <p:sldId id="260" r:id="rId7"/>
+    <p:sldId id="261" r:id="rId8"/>
+    <p:sldId id="262" r:id="rId9"/>
+    <p:sldId id="263" r:id="rId10"/>
+    <p:sldId id="267" r:id="rId11"/>
+    <p:sldId id="265" r:id="rId12"/>
+    <p:sldId id="266" r:id="rId13"/>
+    <p:sldId id="269" r:id="rId14"/>
   </p:sldIdLst>
   <p:sldSz cx="12192000" cy="6858000"/>
   <p:notesSz cx="6858000" cy="9144000"/>
@@ -3679,27 +3681,38 @@
             <p:ph type="subTitle" idx="1"/>
           </p:nvPr>
         </p:nvSpPr>
-        <p:spPr/>
+        <p:spPr>
+          <a:xfrm>
+            <a:off x="2417780" y="3531204"/>
+            <a:ext cx="8637072" cy="1329965"/>
+          </a:xfrm>
+        </p:spPr>
         <p:txBody>
           <a:bodyPr>
-            <a:normAutofit fontScale="62500" lnSpcReduction="20000"/>
+            <a:noAutofit/>
           </a:bodyPr>
           <a:lstStyle/>
           <a:p>
             <a:r>
-              <a:rPr lang="en-US" dirty="0"/>
+              <a:rPr lang="en-US" sz="1100" dirty="0"/>
+              <a:t>A&amp;B Incorporated</a:t>
+            </a:r>
+          </a:p>
+          <a:p>
+            <a:r>
+              <a:rPr lang="en-US" sz="1100" dirty="0"/>
               <a:t>Contributors:</a:t>
             </a:r>
           </a:p>
           <a:p>
             <a:r>
-              <a:rPr lang="en-US" dirty="0"/>
+              <a:rPr lang="en-US" sz="1100" dirty="0"/>
               <a:t>Aurian Ghaemmaghami</a:t>
             </a:r>
           </a:p>
           <a:p>
             <a:r>
-              <a:rPr lang="en-US" dirty="0"/>
+              <a:rPr lang="en-US" sz="1100" dirty="0"/>
               <a:t>Balaji Avvaru</a:t>
             </a:r>
           </a:p>
@@ -3719,6 +3732,154 @@
 </file>
 
 <file path=ppt/slides/slide10.xml><?xml version="1.0" encoding="utf-8"?>
+<p:sld xmlns:a="http://schemas.openxmlformats.org/drawingml/2006/main" xmlns:r="http://schemas.openxmlformats.org/officeDocument/2006/relationships" xmlns:p="http://schemas.openxmlformats.org/presentationml/2006/main">
+  <p:cSld>
+    <p:spTree>
+      <p:nvGrpSpPr>
+        <p:cNvPr id="1" name=""/>
+        <p:cNvGrpSpPr/>
+        <p:nvPr/>
+      </p:nvGrpSpPr>
+      <p:grpSpPr>
+        <a:xfrm>
+          <a:off x="0" y="0"/>
+          <a:ext cx="0" cy="0"/>
+          <a:chOff x="0" y="0"/>
+          <a:chExt cx="0" cy="0"/>
+        </a:xfrm>
+      </p:grpSpPr>
+      <p:sp>
+        <p:nvSpPr>
+          <p:cNvPr id="2" name="Title 1">
+            <a:extLst>
+              <a:ext uri="{FF2B5EF4-FFF2-40B4-BE49-F238E27FC236}">
+                <a16:creationId xmlns:a16="http://schemas.microsoft.com/office/drawing/2014/main" id="{51881777-4C78-448B-A61D-AC87D4717357}"/>
+              </a:ext>
+            </a:extLst>
+          </p:cNvPr>
+          <p:cNvSpPr>
+            <a:spLocks noGrp="1"/>
+          </p:cNvSpPr>
+          <p:nvPr>
+            <p:ph type="title"/>
+          </p:nvPr>
+        </p:nvSpPr>
+        <p:spPr/>
+        <p:txBody>
+          <a:bodyPr/>
+          <a:lstStyle/>
+          <a:p>
+            <a:r>
+              <a:rPr lang="en-US" cap="none" dirty="0"/>
+              <a:t>IBU vs ABV Relationship</a:t>
+            </a:r>
+            <a:endParaRPr lang="en-US" dirty="0"/>
+          </a:p>
+        </p:txBody>
+      </p:sp>
+      <p:sp>
+        <p:nvSpPr>
+          <p:cNvPr id="3" name="Content Placeholder 2">
+            <a:extLst>
+              <a:ext uri="{FF2B5EF4-FFF2-40B4-BE49-F238E27FC236}">
+                <a16:creationId xmlns:a16="http://schemas.microsoft.com/office/drawing/2014/main" id="{DB6F86E9-AC1E-454B-BB46-84BA0122354B}"/>
+              </a:ext>
+            </a:extLst>
+          </p:cNvPr>
+          <p:cNvSpPr>
+            <a:spLocks noGrp="1"/>
+          </p:cNvSpPr>
+          <p:nvPr>
+            <p:ph idx="1"/>
+          </p:nvPr>
+        </p:nvSpPr>
+        <p:spPr>
+          <a:xfrm>
+            <a:off x="361010" y="2582899"/>
+            <a:ext cx="4471049" cy="1692202"/>
+          </a:xfrm>
+        </p:spPr>
+        <p:txBody>
+          <a:bodyPr/>
+          <a:lstStyle/>
+          <a:p>
+            <a:pPr marL="285750" indent="-285750">
+              <a:buFont typeface="Wingdings" panose="05000000000000000000" pitchFamily="2" charset="2"/>
+              <a:buChar char="v"/>
+            </a:pPr>
+            <a:r>
+              <a:rPr lang="en-US" sz="1800" dirty="0"/>
+              <a:t>Positive linear correlation between IBU and ABV</a:t>
+            </a:r>
+          </a:p>
+          <a:p>
+            <a:pPr marL="285750" indent="-285750">
+              <a:buFont typeface="Wingdings" panose="05000000000000000000" pitchFamily="2" charset="2"/>
+              <a:buChar char="v"/>
+            </a:pPr>
+            <a:r>
+              <a:rPr lang="en-US" sz="1800" dirty="0"/>
+              <a:t>As bitterness increases, the ABV tends to increase slightly</a:t>
+            </a:r>
+          </a:p>
+          <a:p>
+            <a:pPr>
+              <a:buFont typeface="Wingdings" panose="05000000000000000000" pitchFamily="2" charset="2"/>
+              <a:buChar char="v"/>
+            </a:pPr>
+            <a:endParaRPr lang="en-US" dirty="0"/>
+          </a:p>
+        </p:txBody>
+      </p:sp>
+      <p:pic>
+        <p:nvPicPr>
+          <p:cNvPr id="4" name="Content Placeholder 3">
+            <a:extLst>
+              <a:ext uri="{FF2B5EF4-FFF2-40B4-BE49-F238E27FC236}">
+                <a16:creationId xmlns:a16="http://schemas.microsoft.com/office/drawing/2014/main" id="{22C2C945-E9A6-427F-B6FA-9A90711B1ACE}"/>
+              </a:ext>
+            </a:extLst>
+          </p:cNvPr>
+          <p:cNvPicPr>
+            <a:picLocks noChangeAspect="1"/>
+          </p:cNvPicPr>
+          <p:nvPr/>
+        </p:nvPicPr>
+        <p:blipFill>
+          <a:blip r:embed="rId2"/>
+          <a:stretch>
+            <a:fillRect/>
+          </a:stretch>
+        </p:blipFill>
+        <p:spPr>
+          <a:xfrm>
+            <a:off x="4832059" y="2158567"/>
+            <a:ext cx="6540206" cy="3449638"/>
+          </a:xfrm>
+          <a:prstGeom prst="rect">
+            <a:avLst/>
+          </a:prstGeom>
+          <a:ln w="12700">
+            <a:solidFill>
+              <a:schemeClr val="tx1"/>
+            </a:solidFill>
+          </a:ln>
+        </p:spPr>
+      </p:pic>
+    </p:spTree>
+    <p:extLst>
+      <p:ext uri="{BB962C8B-B14F-4D97-AF65-F5344CB8AC3E}">
+        <p14:creationId xmlns:p14="http://schemas.microsoft.com/office/powerpoint/2010/main" val="3534215694"/>
+      </p:ext>
+    </p:extLst>
+  </p:cSld>
+  <p:clrMapOvr>
+    <a:masterClrMapping/>
+  </p:clrMapOvr>
+</p:sld>
+</file>
+
+<file path=ppt/slides/slide11.xml><?xml version="1.0" encoding="utf-8"?>
 <p:sld xmlns:a="http://schemas.openxmlformats.org/drawingml/2006/main" xmlns:r="http://schemas.openxmlformats.org/officeDocument/2006/relationships" xmlns:p="http://schemas.openxmlformats.org/presentationml/2006/main">
   <p:cSld>
     <p:bg>
@@ -4129,7 +4290,7 @@
 </p:sld>
 </file>
 
-<file path=ppt/slides/slide11.xml><?xml version="1.0" encoding="utf-8"?>
+<file path=ppt/slides/slide12.xml><?xml version="1.0" encoding="utf-8"?>
 <p:sld xmlns:a="http://schemas.openxmlformats.org/drawingml/2006/main" xmlns:r="http://schemas.openxmlformats.org/officeDocument/2006/relationships" xmlns:p="http://schemas.openxmlformats.org/presentationml/2006/main">
   <p:cSld>
     <p:spTree>
@@ -4307,7 +4468,341 @@
 </p:sld>
 </file>
 
+<file path=ppt/slides/slide13.xml><?xml version="1.0" encoding="utf-8"?>
+<p:sld xmlns:a="http://schemas.openxmlformats.org/drawingml/2006/main" xmlns:r="http://schemas.openxmlformats.org/officeDocument/2006/relationships" xmlns:p="http://schemas.openxmlformats.org/presentationml/2006/main">
+  <p:cSld>
+    <p:spTree>
+      <p:nvGrpSpPr>
+        <p:cNvPr id="1" name=""/>
+        <p:cNvGrpSpPr/>
+        <p:nvPr/>
+      </p:nvGrpSpPr>
+      <p:grpSpPr>
+        <a:xfrm>
+          <a:off x="0" y="0"/>
+          <a:ext cx="0" cy="0"/>
+          <a:chOff x="0" y="0"/>
+          <a:chExt cx="0" cy="0"/>
+        </a:xfrm>
+      </p:grpSpPr>
+      <p:sp>
+        <p:nvSpPr>
+          <p:cNvPr id="2" name="Title 1">
+            <a:extLst>
+              <a:ext uri="{FF2B5EF4-FFF2-40B4-BE49-F238E27FC236}">
+                <a16:creationId xmlns:a16="http://schemas.microsoft.com/office/drawing/2014/main" id="{2A331158-4E80-430C-AD92-430A62CC3E74}"/>
+              </a:ext>
+            </a:extLst>
+          </p:cNvPr>
+          <p:cNvSpPr>
+            <a:spLocks noGrp="1"/>
+          </p:cNvSpPr>
+          <p:nvPr>
+            <p:ph type="title"/>
+          </p:nvPr>
+        </p:nvSpPr>
+        <p:spPr/>
+        <p:txBody>
+          <a:bodyPr/>
+          <a:lstStyle/>
+          <a:p>
+            <a:r>
+              <a:rPr lang="en-US" dirty="0"/>
+              <a:t>Conclusion</a:t>
+            </a:r>
+          </a:p>
+        </p:txBody>
+      </p:sp>
+      <p:sp>
+        <p:nvSpPr>
+          <p:cNvPr id="3" name="Content Placeholder 2">
+            <a:extLst>
+              <a:ext uri="{FF2B5EF4-FFF2-40B4-BE49-F238E27FC236}">
+                <a16:creationId xmlns:a16="http://schemas.microsoft.com/office/drawing/2014/main" id="{84D203E5-14CC-4615-978D-E5FA6948AAB4}"/>
+              </a:ext>
+            </a:extLst>
+          </p:cNvPr>
+          <p:cNvSpPr>
+            <a:spLocks noGrp="1"/>
+          </p:cNvSpPr>
+          <p:nvPr>
+            <p:ph sz="half" idx="1"/>
+          </p:nvPr>
+        </p:nvSpPr>
+        <p:spPr>
+          <a:xfrm>
+            <a:off x="1447330" y="2010878"/>
+            <a:ext cx="9733287" cy="3448595"/>
+          </a:xfrm>
+        </p:spPr>
+        <p:txBody>
+          <a:bodyPr>
+            <a:normAutofit fontScale="85000" lnSpcReduction="20000"/>
+          </a:bodyPr>
+          <a:lstStyle/>
+          <a:p>
+            <a:pPr>
+              <a:buFont typeface="Wingdings" panose="05000000000000000000" pitchFamily="2" charset="2"/>
+              <a:buChar char="v"/>
+            </a:pPr>
+            <a:r>
+              <a:rPr lang="en-US" dirty="0"/>
+              <a:t>States with highest breweries – Colorado, California and Michigan</a:t>
+            </a:r>
+          </a:p>
+          <a:p>
+            <a:pPr>
+              <a:buFont typeface="Wingdings" panose="05000000000000000000" pitchFamily="2" charset="2"/>
+              <a:buChar char="v"/>
+            </a:pPr>
+            <a:r>
+              <a:rPr lang="en-US" dirty="0"/>
+              <a:t>States with highest ABV and IBU are Colorado and Oregon</a:t>
+            </a:r>
+          </a:p>
+          <a:p>
+            <a:pPr>
+              <a:buFont typeface="Wingdings" panose="05000000000000000000" pitchFamily="2" charset="2"/>
+              <a:buChar char="v"/>
+            </a:pPr>
+            <a:r>
+              <a:rPr lang="en-US" dirty="0"/>
+              <a:t>Medial alcohol content per state is fairly consistent around 6% and median international bitterness per state is very much varied.</a:t>
+            </a:r>
+          </a:p>
+          <a:p>
+            <a:pPr>
+              <a:buFont typeface="Wingdings" panose="05000000000000000000" pitchFamily="2" charset="2"/>
+              <a:buChar char="v"/>
+            </a:pPr>
+            <a:r>
+              <a:rPr lang="en-US" dirty="0"/>
+              <a:t>There is evidence to suggest that a positive linear relationship exists between IBU and ABV</a:t>
+            </a:r>
+          </a:p>
+          <a:p>
+            <a:pPr>
+              <a:buFont typeface="Wingdings" panose="05000000000000000000" pitchFamily="2" charset="2"/>
+              <a:buChar char="v"/>
+            </a:pPr>
+            <a:r>
+              <a:rPr lang="en-US" dirty="0"/>
+              <a:t>K-NN model to identify beer type based on ABV and IBU values – accuracy of 88.6%</a:t>
+            </a:r>
+          </a:p>
+          <a:p>
+            <a:pPr>
+              <a:buFont typeface="Wingdings" panose="05000000000000000000" pitchFamily="2" charset="2"/>
+              <a:buChar char="v"/>
+            </a:pPr>
+            <a:r>
+              <a:rPr lang="en-US" dirty="0"/>
+              <a:t>Target higher ABV areas to produce more IPA’s to increase sales</a:t>
+            </a:r>
+          </a:p>
+          <a:p>
+            <a:pPr>
+              <a:buFont typeface="Wingdings" panose="05000000000000000000" pitchFamily="2" charset="2"/>
+              <a:buChar char="v"/>
+            </a:pPr>
+            <a:r>
+              <a:rPr lang="en-US" dirty="0"/>
+              <a:t>Target higher ABV areas for new IPA product launches</a:t>
+            </a:r>
+          </a:p>
+          <a:p>
+            <a:pPr>
+              <a:buFont typeface="Wingdings" panose="05000000000000000000" pitchFamily="2" charset="2"/>
+              <a:buChar char="v"/>
+            </a:pPr>
+            <a:r>
+              <a:rPr lang="en-US" dirty="0"/>
+              <a:t>Top 3: Texas, South Carolina, Virginia</a:t>
+            </a:r>
+          </a:p>
+          <a:p>
+            <a:endParaRPr lang="en-US" dirty="0"/>
+          </a:p>
+        </p:txBody>
+      </p:sp>
+    </p:spTree>
+    <p:extLst>
+      <p:ext uri="{BB962C8B-B14F-4D97-AF65-F5344CB8AC3E}">
+        <p14:creationId xmlns:p14="http://schemas.microsoft.com/office/powerpoint/2010/main" val="2838611225"/>
+      </p:ext>
+    </p:extLst>
+  </p:cSld>
+  <p:clrMapOvr>
+    <a:masterClrMapping/>
+  </p:clrMapOvr>
+</p:sld>
+</file>
+
 <file path=ppt/slides/slide2.xml><?xml version="1.0" encoding="utf-8"?>
+<p:sld xmlns:a="http://schemas.openxmlformats.org/drawingml/2006/main" xmlns:r="http://schemas.openxmlformats.org/officeDocument/2006/relationships" xmlns:p="http://schemas.openxmlformats.org/presentationml/2006/main">
+  <p:cSld>
+    <p:spTree>
+      <p:nvGrpSpPr>
+        <p:cNvPr id="1" name=""/>
+        <p:cNvGrpSpPr/>
+        <p:nvPr/>
+      </p:nvGrpSpPr>
+      <p:grpSpPr>
+        <a:xfrm>
+          <a:off x="0" y="0"/>
+          <a:ext cx="0" cy="0"/>
+          <a:chOff x="0" y="0"/>
+          <a:chExt cx="0" cy="0"/>
+        </a:xfrm>
+      </p:grpSpPr>
+      <p:sp>
+        <p:nvSpPr>
+          <p:cNvPr id="2" name="Title 1">
+            <a:extLst>
+              <a:ext uri="{FF2B5EF4-FFF2-40B4-BE49-F238E27FC236}">
+                <a16:creationId xmlns:a16="http://schemas.microsoft.com/office/drawing/2014/main" id="{090A0C41-F7E5-4441-81A5-E13E939DF9E1}"/>
+              </a:ext>
+            </a:extLst>
+          </p:cNvPr>
+          <p:cNvSpPr>
+            <a:spLocks noGrp="1"/>
+          </p:cNvSpPr>
+          <p:nvPr>
+            <p:ph type="title"/>
+          </p:nvPr>
+        </p:nvSpPr>
+        <p:spPr/>
+        <p:txBody>
+          <a:bodyPr/>
+          <a:lstStyle/>
+          <a:p>
+            <a:r>
+              <a:rPr lang="en-US" dirty="0"/>
+              <a:t>Case Study Analysis</a:t>
+            </a:r>
+          </a:p>
+        </p:txBody>
+      </p:sp>
+      <p:sp>
+        <p:nvSpPr>
+          <p:cNvPr id="3" name="Content Placeholder 2">
+            <a:extLst>
+              <a:ext uri="{FF2B5EF4-FFF2-40B4-BE49-F238E27FC236}">
+                <a16:creationId xmlns:a16="http://schemas.microsoft.com/office/drawing/2014/main" id="{8E842E4C-FEA8-481C-946B-1BC945E3C352}"/>
+              </a:ext>
+            </a:extLst>
+          </p:cNvPr>
+          <p:cNvSpPr>
+            <a:spLocks noGrp="1"/>
+          </p:cNvSpPr>
+          <p:nvPr>
+            <p:ph idx="1"/>
+          </p:nvPr>
+        </p:nvSpPr>
+        <p:spPr/>
+        <p:txBody>
+          <a:bodyPr>
+            <a:normAutofit lnSpcReduction="10000"/>
+          </a:bodyPr>
+          <a:lstStyle/>
+          <a:p>
+            <a:pPr marL="0" indent="0">
+              <a:buNone/>
+            </a:pPr>
+            <a:r>
+              <a:rPr lang="en-US" sz="1800" dirty="0"/>
+              <a:t>We examined below topics as part of our analysis:</a:t>
+            </a:r>
+          </a:p>
+          <a:p>
+            <a:pPr lvl="1">
+              <a:buFont typeface="Wingdings" panose="05000000000000000000" pitchFamily="2" charset="2"/>
+              <a:buChar char="v"/>
+            </a:pPr>
+            <a:r>
+              <a:rPr lang="en-US" dirty="0"/>
+              <a:t>Breweries per state</a:t>
+            </a:r>
+          </a:p>
+          <a:p>
+            <a:pPr lvl="1">
+              <a:buFont typeface="Wingdings" panose="05000000000000000000" pitchFamily="2" charset="2"/>
+              <a:buChar char="v"/>
+            </a:pPr>
+            <a:r>
+              <a:rPr lang="en-US" dirty="0"/>
+              <a:t>Median alcohol content (ABV) per state</a:t>
+            </a:r>
+          </a:p>
+          <a:p>
+            <a:pPr lvl="1">
+              <a:buFont typeface="Wingdings" panose="05000000000000000000" pitchFamily="2" charset="2"/>
+              <a:buChar char="v"/>
+            </a:pPr>
+            <a:r>
+              <a:rPr lang="en-US" dirty="0"/>
+              <a:t>Median international bitterness (IBU) per state</a:t>
+            </a:r>
+          </a:p>
+          <a:p>
+            <a:pPr lvl="1">
+              <a:buFont typeface="Wingdings" panose="05000000000000000000" pitchFamily="2" charset="2"/>
+              <a:buChar char="v"/>
+            </a:pPr>
+            <a:r>
+              <a:rPr lang="en-US" dirty="0"/>
+              <a:t>Beers with highest alcohol by volume (ABV) and international bitterness unit (IBU)</a:t>
+            </a:r>
+          </a:p>
+          <a:p>
+            <a:pPr lvl="1">
+              <a:buFont typeface="Wingdings" panose="05000000000000000000" pitchFamily="2" charset="2"/>
+              <a:buChar char="v"/>
+            </a:pPr>
+            <a:r>
+              <a:rPr lang="en-US" dirty="0"/>
+              <a:t>Summary stats of alcohol by volume(abv)</a:t>
+            </a:r>
+          </a:p>
+          <a:p>
+            <a:pPr lvl="1">
+              <a:buFont typeface="Wingdings" panose="05000000000000000000" pitchFamily="2" charset="2"/>
+              <a:buChar char="v"/>
+            </a:pPr>
+            <a:r>
+              <a:rPr lang="en-US" dirty="0"/>
+              <a:t>Analysis of relationship between alcohol by volume (ABV) and international bitterness unit (IBU)</a:t>
+            </a:r>
+          </a:p>
+          <a:p>
+            <a:pPr lvl="1">
+              <a:buFont typeface="Wingdings" panose="05000000000000000000" pitchFamily="2" charset="2"/>
+              <a:buChar char="v"/>
+            </a:pPr>
+            <a:r>
+              <a:rPr lang="en-US" dirty="0"/>
+              <a:t>Investigate the difference with respect to ABV and IBU between IPAs and other types of ale</a:t>
+            </a:r>
+          </a:p>
+          <a:p>
+            <a:endParaRPr lang="en-US" dirty="0"/>
+          </a:p>
+        </p:txBody>
+      </p:sp>
+    </p:spTree>
+    <p:extLst>
+      <p:ext uri="{BB962C8B-B14F-4D97-AF65-F5344CB8AC3E}">
+        <p14:creationId xmlns:p14="http://schemas.microsoft.com/office/powerpoint/2010/main" val="2215422527"/>
+      </p:ext>
+    </p:extLst>
+  </p:cSld>
+  <p:clrMapOvr>
+    <a:masterClrMapping/>
+  </p:clrMapOvr>
+</p:sld>
+</file>
+
+<file path=ppt/slides/slide3.xml><?xml version="1.0" encoding="utf-8"?>
 <p:sld xmlns:a="http://schemas.openxmlformats.org/drawingml/2006/main" xmlns:r="http://schemas.openxmlformats.org/officeDocument/2006/relationships" xmlns:p="http://schemas.openxmlformats.org/presentationml/2006/main">
   <p:cSld>
     <p:spTree>
@@ -5172,7 +5667,7 @@
 </p:sld>
 </file>
 
-<file path=ppt/slides/slide3.xml><?xml version="1.0" encoding="utf-8"?>
+<file path=ppt/slides/slide4.xml><?xml version="1.0" encoding="utf-8"?>
 <p:sld xmlns:a="http://schemas.openxmlformats.org/drawingml/2006/main" xmlns:r="http://schemas.openxmlformats.org/officeDocument/2006/relationships" xmlns:p="http://schemas.openxmlformats.org/presentationml/2006/main">
   <p:cSld>
     <p:spTree>
@@ -5292,7 +5787,7 @@
 </p:sld>
 </file>
 
-<file path=ppt/slides/slide4.xml><?xml version="1.0" encoding="utf-8"?>
+<file path=ppt/slides/slide5.xml><?xml version="1.0" encoding="utf-8"?>
 <p:sld xmlns:a="http://schemas.openxmlformats.org/drawingml/2006/main" xmlns:r="http://schemas.openxmlformats.org/officeDocument/2006/relationships" xmlns:p="http://schemas.openxmlformats.org/presentationml/2006/main">
   <p:cSld>
     <p:spTree>
@@ -6152,7 +6647,7 @@
 </p:sld>
 </file>
 
-<file path=ppt/slides/slide5.xml><?xml version="1.0" encoding="utf-8"?>
+<file path=ppt/slides/slide6.xml><?xml version="1.0" encoding="utf-8"?>
 <p:sld xmlns:a="http://schemas.openxmlformats.org/drawingml/2006/main" xmlns:r="http://schemas.openxmlformats.org/officeDocument/2006/relationships" xmlns:p="http://schemas.openxmlformats.org/presentationml/2006/main">
   <p:cSld>
     <p:spTree>
@@ -7012,7 +7507,7 @@
 </p:sld>
 </file>
 
-<file path=ppt/slides/slide6.xml><?xml version="1.0" encoding="utf-8"?>
+<file path=ppt/slides/slide7.xml><?xml version="1.0" encoding="utf-8"?>
 <p:sld xmlns:a="http://schemas.openxmlformats.org/drawingml/2006/main" xmlns:r="http://schemas.openxmlformats.org/officeDocument/2006/relationships" xmlns:p="http://schemas.openxmlformats.org/presentationml/2006/main">
   <p:cSld>
     <p:spTree>
@@ -8038,7 +8533,7 @@
 </p:sld>
 </file>
 
-<file path=ppt/slides/slide7.xml><?xml version="1.0" encoding="utf-8"?>
+<file path=ppt/slides/slide8.xml><?xml version="1.0" encoding="utf-8"?>
 <p:sld xmlns:a="http://schemas.openxmlformats.org/drawingml/2006/main" xmlns:r="http://schemas.openxmlformats.org/officeDocument/2006/relationships" xmlns:p="http://schemas.openxmlformats.org/presentationml/2006/main">
   <p:cSld>
     <p:spTree>
@@ -9064,7 +9559,7 @@
 </p:sld>
 </file>
 
-<file path=ppt/slides/slide8.xml><?xml version="1.0" encoding="utf-8"?>
+<file path=ppt/slides/slide9.xml><?xml version="1.0" encoding="utf-8"?>
 <p:sld xmlns:a="http://schemas.openxmlformats.org/drawingml/2006/main" xmlns:r="http://schemas.openxmlformats.org/officeDocument/2006/relationships" xmlns:p="http://schemas.openxmlformats.org/presentationml/2006/main">
   <p:cSld>
     <p:spTree>
@@ -10175,154 +10670,6 @@
     <p:extLst>
       <p:ext uri="{BB962C8B-B14F-4D97-AF65-F5344CB8AC3E}">
         <p14:creationId xmlns:p14="http://schemas.microsoft.com/office/powerpoint/2010/main" val="1329204041"/>
-      </p:ext>
-    </p:extLst>
-  </p:cSld>
-  <p:clrMapOvr>
-    <a:masterClrMapping/>
-  </p:clrMapOvr>
-</p:sld>
-</file>
-
-<file path=ppt/slides/slide9.xml><?xml version="1.0" encoding="utf-8"?>
-<p:sld xmlns:a="http://schemas.openxmlformats.org/drawingml/2006/main" xmlns:r="http://schemas.openxmlformats.org/officeDocument/2006/relationships" xmlns:p="http://schemas.openxmlformats.org/presentationml/2006/main">
-  <p:cSld>
-    <p:spTree>
-      <p:nvGrpSpPr>
-        <p:cNvPr id="1" name=""/>
-        <p:cNvGrpSpPr/>
-        <p:nvPr/>
-      </p:nvGrpSpPr>
-      <p:grpSpPr>
-        <a:xfrm>
-          <a:off x="0" y="0"/>
-          <a:ext cx="0" cy="0"/>
-          <a:chOff x="0" y="0"/>
-          <a:chExt cx="0" cy="0"/>
-        </a:xfrm>
-      </p:grpSpPr>
-      <p:sp>
-        <p:nvSpPr>
-          <p:cNvPr id="2" name="Title 1">
-            <a:extLst>
-              <a:ext uri="{FF2B5EF4-FFF2-40B4-BE49-F238E27FC236}">
-                <a16:creationId xmlns:a16="http://schemas.microsoft.com/office/drawing/2014/main" id="{51881777-4C78-448B-A61D-AC87D4717357}"/>
-              </a:ext>
-            </a:extLst>
-          </p:cNvPr>
-          <p:cNvSpPr>
-            <a:spLocks noGrp="1"/>
-          </p:cNvSpPr>
-          <p:nvPr>
-            <p:ph type="title"/>
-          </p:nvPr>
-        </p:nvSpPr>
-        <p:spPr/>
-        <p:txBody>
-          <a:bodyPr/>
-          <a:lstStyle/>
-          <a:p>
-            <a:r>
-              <a:rPr lang="en-US" cap="none" dirty="0"/>
-              <a:t>IBU vs ABV Relationship</a:t>
-            </a:r>
-            <a:endParaRPr lang="en-US" dirty="0"/>
-          </a:p>
-        </p:txBody>
-      </p:sp>
-      <p:sp>
-        <p:nvSpPr>
-          <p:cNvPr id="3" name="Content Placeholder 2">
-            <a:extLst>
-              <a:ext uri="{FF2B5EF4-FFF2-40B4-BE49-F238E27FC236}">
-                <a16:creationId xmlns:a16="http://schemas.microsoft.com/office/drawing/2014/main" id="{DB6F86E9-AC1E-454B-BB46-84BA0122354B}"/>
-              </a:ext>
-            </a:extLst>
-          </p:cNvPr>
-          <p:cNvSpPr>
-            <a:spLocks noGrp="1"/>
-          </p:cNvSpPr>
-          <p:nvPr>
-            <p:ph idx="1"/>
-          </p:nvPr>
-        </p:nvSpPr>
-        <p:spPr>
-          <a:xfrm>
-            <a:off x="361010" y="2582899"/>
-            <a:ext cx="4471049" cy="1692202"/>
-          </a:xfrm>
-        </p:spPr>
-        <p:txBody>
-          <a:bodyPr/>
-          <a:lstStyle/>
-          <a:p>
-            <a:pPr marL="285750" indent="-285750">
-              <a:buFont typeface="Wingdings" panose="05000000000000000000" pitchFamily="2" charset="2"/>
-              <a:buChar char="v"/>
-            </a:pPr>
-            <a:r>
-              <a:rPr lang="en-US" sz="1800" dirty="0"/>
-              <a:t>Positive linear correlation between IBU and ABV</a:t>
-            </a:r>
-          </a:p>
-          <a:p>
-            <a:pPr marL="285750" indent="-285750">
-              <a:buFont typeface="Wingdings" panose="05000000000000000000" pitchFamily="2" charset="2"/>
-              <a:buChar char="v"/>
-            </a:pPr>
-            <a:r>
-              <a:rPr lang="en-US" sz="1800" dirty="0"/>
-              <a:t>As bitterness increases, the ABV tends to increase slightly</a:t>
-            </a:r>
-          </a:p>
-          <a:p>
-            <a:pPr>
-              <a:buFont typeface="Wingdings" panose="05000000000000000000" pitchFamily="2" charset="2"/>
-              <a:buChar char="v"/>
-            </a:pPr>
-            <a:endParaRPr lang="en-US" dirty="0"/>
-          </a:p>
-        </p:txBody>
-      </p:sp>
-      <p:pic>
-        <p:nvPicPr>
-          <p:cNvPr id="4" name="Content Placeholder 3">
-            <a:extLst>
-              <a:ext uri="{FF2B5EF4-FFF2-40B4-BE49-F238E27FC236}">
-                <a16:creationId xmlns:a16="http://schemas.microsoft.com/office/drawing/2014/main" id="{22C2C945-E9A6-427F-B6FA-9A90711B1ACE}"/>
-              </a:ext>
-            </a:extLst>
-          </p:cNvPr>
-          <p:cNvPicPr>
-            <a:picLocks noChangeAspect="1"/>
-          </p:cNvPicPr>
-          <p:nvPr/>
-        </p:nvPicPr>
-        <p:blipFill>
-          <a:blip r:embed="rId2"/>
-          <a:stretch>
-            <a:fillRect/>
-          </a:stretch>
-        </p:blipFill>
-        <p:spPr>
-          <a:xfrm>
-            <a:off x="4832059" y="2158567"/>
-            <a:ext cx="6540206" cy="3449638"/>
-          </a:xfrm>
-          <a:prstGeom prst="rect">
-            <a:avLst/>
-          </a:prstGeom>
-          <a:ln w="12700">
-            <a:solidFill>
-              <a:schemeClr val="tx1"/>
-            </a:solidFill>
-          </a:ln>
-        </p:spPr>
-      </p:pic>
-    </p:spTree>
-    <p:extLst>
-      <p:ext uri="{BB962C8B-B14F-4D97-AF65-F5344CB8AC3E}">
-        <p14:creationId xmlns:p14="http://schemas.microsoft.com/office/powerpoint/2010/main" val="3534215694"/>
       </p:ext>
     </p:extLst>
   </p:cSld>

</xml_diff>